<commit_message>
incorporated ideas from Adeel & Jon into L2.2
</commit_message>
<xml_diff>
--- a/Slides/Lesson 2.2 The Architectural Scale.pptx
+++ b/Slides/Lesson 2.2 The Architectural Scale.pptx
@@ -5,7 +5,7 @@
     <p:sldMasterId id="2147483648" r:id="rId1"/>
   </p:sldMasterIdLst>
   <p:notesMasterIdLst>
-    <p:notesMasterId r:id="rId17"/>
+    <p:notesMasterId r:id="rId18"/>
   </p:notesMasterIdLst>
   <p:sldIdLst>
     <p:sldId id="485" r:id="rId2"/>
@@ -20,30 +20,31 @@
     <p:sldId id="419" r:id="rId11"/>
     <p:sldId id="420" r:id="rId12"/>
     <p:sldId id="421" r:id="rId13"/>
-    <p:sldId id="422" r:id="rId14"/>
-    <p:sldId id="424" r:id="rId15"/>
-    <p:sldId id="486" r:id="rId16"/>
+    <p:sldId id="487" r:id="rId14"/>
+    <p:sldId id="422" r:id="rId15"/>
+    <p:sldId id="424" r:id="rId16"/>
+    <p:sldId id="486" r:id="rId17"/>
   </p:sldIdLst>
   <p:sldSz cx="12192000" cy="6858000"/>
   <p:notesSz cx="6858000" cy="9144000"/>
   <p:embeddedFontLst>
     <p:embeddedFont>
       <p:font typeface="Calibri" panose="020F0502020204030204" pitchFamily="34" charset="0"/>
-      <p:regular r:id="rId18"/>
-      <p:bold r:id="rId19"/>
-      <p:italic r:id="rId20"/>
-      <p:boldItalic r:id="rId21"/>
+      <p:regular r:id="rId19"/>
+      <p:bold r:id="rId20"/>
+      <p:italic r:id="rId21"/>
+      <p:boldItalic r:id="rId22"/>
     </p:embeddedFont>
     <p:embeddedFont>
       <p:font typeface="Lucida Console" panose="020B0609040504020204" pitchFamily="49" charset="0"/>
-      <p:regular r:id="rId22"/>
+      <p:regular r:id="rId23"/>
     </p:embeddedFont>
     <p:embeddedFont>
       <p:font typeface="Verdana" panose="020B0604030504040204" pitchFamily="34" charset="0"/>
-      <p:regular r:id="rId23"/>
-      <p:bold r:id="rId24"/>
-      <p:italic r:id="rId25"/>
-      <p:boldItalic r:id="rId26"/>
+      <p:regular r:id="rId24"/>
+      <p:bold r:id="rId25"/>
+      <p:italic r:id="rId26"/>
+      <p:boldItalic r:id="rId27"/>
     </p:embeddedFont>
   </p:embeddedFontLst>
   <p:defaultTextStyle>
@@ -158,6 +159,7 @@
             <p14:sldId id="419"/>
             <p14:sldId id="420"/>
             <p14:sldId id="421"/>
+            <p14:sldId id="487"/>
             <p14:sldId id="422"/>
             <p14:sldId id="424"/>
             <p14:sldId id="486"/>
@@ -254,7 +256,7 @@
           <a:p>
             <a:fld id="{7C7E5181-6CF5-45F7-A87A-E0E0B1FD7549}" type="datetimeFigureOut">
               <a:rPr lang="en-US" smtClean="0"/>
-              <a:t>1/12/2022</a:t>
+              <a:t>1/22/2022</a:t>
             </a:fld>
             <a:endParaRPr lang="en-US"/>
           </a:p>
@@ -922,10 +924,7 @@
           <a:bodyPr/>
           <a:lstStyle/>
           <a:p>
-            <a:r>
-              <a:rPr lang="en-US" dirty="0"/>
-              <a:t>Many popular systems use this architecture.   Visual Studio Code uses this architecture to allow users to build popular extensions.   Git provides modifications by allowing the user to substitute their own file in place of the 11 files listed.</a:t>
-            </a:r>
+            <a:endParaRPr lang="en-US" dirty="0"/>
           </a:p>
         </p:txBody>
       </p:sp>
@@ -955,7 +954,7 @@
     </p:spTree>
     <p:extLst>
       <p:ext uri="{BB962C8B-B14F-4D97-AF65-F5344CB8AC3E}">
-        <p14:creationId xmlns:p14="http://schemas.microsoft.com/office/powerpoint/2010/main" val="705332254"/>
+        <p14:creationId xmlns:p14="http://schemas.microsoft.com/office/powerpoint/2010/main" val="2807325679"/>
       </p:ext>
     </p:extLst>
   </p:cSld>
@@ -1011,17 +1010,13 @@
           <a:p>
             <a:r>
               <a:rPr lang="en-US" dirty="0"/>
-              <a:t>Our last example architecture is an event-driven architecture.  This is like a pipeline architecture, except that data may take one of many paths through the system.  Each processing unit has an in-box and one or more out-boxes, which are typically asynchronous message queues.</a:t>
-            </a:r>
-          </a:p>
-          <a:p>
+              <a:t>Many popular systems use this architecture.   Visual Studio Code uses this architecture to allow users to build popular extensions.   Git provides modifications by allowing the user to substitute their own file in place of the 11 files listed</a:t>
+            </a:r>
+            <a:r>
+              <a:rPr lang="en-US"/>
+              <a:t>. </a:t>
+            </a:r>
             <a:endParaRPr lang="en-US" dirty="0"/>
-          </a:p>
-          <a:p>
-            <a:r>
-              <a:rPr lang="en-US" dirty="0"/>
-              <a:t>Here, for example, is the workflow for a book-ordering system.</a:t>
-            </a:r>
           </a:p>
         </p:txBody>
       </p:sp>
@@ -1043,6 +1038,102 @@
             <a:fld id="{07937F07-1250-4CCE-B198-1B2887014F41}" type="slidenum">
               <a:rPr lang="en-US" smtClean="0"/>
               <a:t>14</a:t>
+            </a:fld>
+            <a:endParaRPr lang="en-US"/>
+          </a:p>
+        </p:txBody>
+      </p:sp>
+    </p:spTree>
+    <p:extLst>
+      <p:ext uri="{BB962C8B-B14F-4D97-AF65-F5344CB8AC3E}">
+        <p14:creationId xmlns:p14="http://schemas.microsoft.com/office/powerpoint/2010/main" val="705332254"/>
+      </p:ext>
+    </p:extLst>
+  </p:cSld>
+  <p:clrMapOvr>
+    <a:masterClrMapping/>
+  </p:clrMapOvr>
+</p:notes>
+</file>
+
+<file path=ppt/notesSlides/notesSlide15.xml><?xml version="1.0" encoding="utf-8"?>
+<p:notes xmlns:a="http://schemas.openxmlformats.org/drawingml/2006/main" xmlns:r="http://schemas.openxmlformats.org/officeDocument/2006/relationships" xmlns:p="http://schemas.openxmlformats.org/presentationml/2006/main">
+  <p:cSld>
+    <p:spTree>
+      <p:nvGrpSpPr>
+        <p:cNvPr id="1" name=""/>
+        <p:cNvGrpSpPr/>
+        <p:nvPr/>
+      </p:nvGrpSpPr>
+      <p:grpSpPr>
+        <a:xfrm>
+          <a:off x="0" y="0"/>
+          <a:ext cx="0" cy="0"/>
+          <a:chOff x="0" y="0"/>
+          <a:chExt cx="0" cy="0"/>
+        </a:xfrm>
+      </p:grpSpPr>
+      <p:sp>
+        <p:nvSpPr>
+          <p:cNvPr id="2" name="Slide Image Placeholder 1"/>
+          <p:cNvSpPr>
+            <a:spLocks noGrp="1" noRot="1" noChangeAspect="1"/>
+          </p:cNvSpPr>
+          <p:nvPr>
+            <p:ph type="sldImg"/>
+          </p:nvPr>
+        </p:nvSpPr>
+        <p:spPr/>
+      </p:sp>
+      <p:sp>
+        <p:nvSpPr>
+          <p:cNvPr id="3" name="Notes Placeholder 2"/>
+          <p:cNvSpPr>
+            <a:spLocks noGrp="1"/>
+          </p:cNvSpPr>
+          <p:nvPr>
+            <p:ph type="body" idx="1"/>
+          </p:nvPr>
+        </p:nvSpPr>
+        <p:spPr/>
+        <p:txBody>
+          <a:bodyPr/>
+          <a:lstStyle/>
+          <a:p>
+            <a:r>
+              <a:rPr lang="en-US" dirty="0"/>
+              <a:t>Our last example architecture is an event-driven architecture.  This is like a pipeline architecture, except that data may take one of many paths through the system.  Each processing unit has an in-box and one or more out-boxes, which are typically asynchronous message queues.</a:t>
+            </a:r>
+          </a:p>
+          <a:p>
+            <a:endParaRPr lang="en-US" dirty="0"/>
+          </a:p>
+          <a:p>
+            <a:r>
+              <a:rPr lang="en-US" dirty="0"/>
+              <a:t>Here, for example, is the workflow for a book-ordering system.</a:t>
+            </a:r>
+          </a:p>
+        </p:txBody>
+      </p:sp>
+      <p:sp>
+        <p:nvSpPr>
+          <p:cNvPr id="4" name="Slide Number Placeholder 3"/>
+          <p:cNvSpPr>
+            <a:spLocks noGrp="1"/>
+          </p:cNvSpPr>
+          <p:nvPr>
+            <p:ph type="sldNum" sz="quarter" idx="5"/>
+          </p:nvPr>
+        </p:nvSpPr>
+        <p:spPr/>
+        <p:txBody>
+          <a:bodyPr/>
+          <a:lstStyle/>
+          <a:p>
+            <a:fld id="{07937F07-1250-4CCE-B198-1B2887014F41}" type="slidenum">
+              <a:rPr lang="en-US" smtClean="0"/>
+              <a:t>15</a:t>
             </a:fld>
             <a:endParaRPr lang="en-US"/>
           </a:p>
@@ -1371,7 +1462,7 @@
           <a:p>
             <a:r>
               <a:rPr lang="en-US" dirty="0"/>
-              <a:t>In this lesson, we will look briefly at 4 different architectural styles: &lt;read slide&gt;</a:t>
+              <a:t>In this lesson, we will look briefly at  different architectural styles: &lt;read slide&gt;</a:t>
             </a:r>
           </a:p>
         </p:txBody>
@@ -1950,7 +2041,7 @@
           <a:p>
             <a:fld id="{5D2A64DE-480B-420F-9649-4F8E696E08E0}" type="datetime1">
               <a:rPr lang="en-US" smtClean="0"/>
-              <a:t>1/12/2022</a:t>
+              <a:t>1/22/2022</a:t>
             </a:fld>
             <a:endParaRPr lang="en-US"/>
           </a:p>
@@ -2274,7 +2365,7 @@
           <a:p>
             <a:fld id="{EA476A42-A091-4468-A075-64A31BE59948}" type="datetime1">
               <a:rPr lang="en-US" smtClean="0"/>
-              <a:t>1/12/2022</a:t>
+              <a:t>1/22/2022</a:t>
             </a:fld>
             <a:endParaRPr lang="en-US"/>
           </a:p>
@@ -2472,7 +2563,7 @@
           <a:p>
             <a:fld id="{0D3616D0-8311-4107-9726-6B805E7D05BA}" type="datetime1">
               <a:rPr lang="en-US" smtClean="0"/>
-              <a:t>1/12/2022</a:t>
+              <a:t>1/22/2022</a:t>
             </a:fld>
             <a:endParaRPr lang="en-US"/>
           </a:p>
@@ -2680,7 +2771,7 @@
           <a:p>
             <a:fld id="{3BC2557A-5C88-417A-A763-5AC779462A5F}" type="datetime1">
               <a:rPr lang="en-US" smtClean="0"/>
-              <a:t>1/12/2022</a:t>
+              <a:t>1/22/2022</a:t>
             </a:fld>
             <a:endParaRPr lang="en-US"/>
           </a:p>
@@ -3204,7 +3295,7 @@
           <a:p>
             <a:fld id="{07C7BFD4-467E-4EDE-93EA-052F5B39A4E5}" type="datetime1">
               <a:rPr lang="en-US" smtClean="0"/>
-              <a:t>1/12/2022</a:t>
+              <a:t>1/22/2022</a:t>
             </a:fld>
             <a:endParaRPr lang="en-US"/>
           </a:p>
@@ -3454,7 +3545,7 @@
           <a:p>
             <a:fld id="{07C7BFD4-467E-4EDE-93EA-052F5B39A4E5}" type="datetime1">
               <a:rPr lang="en-US" smtClean="0"/>
-              <a:t>1/12/2022</a:t>
+              <a:t>1/22/2022</a:t>
             </a:fld>
             <a:endParaRPr lang="en-US"/>
           </a:p>
@@ -3636,7 +3727,7 @@
           <a:p>
             <a:fld id="{109E55A0-C911-4F03-82FC-7E5926047D46}" type="datetime1">
               <a:rPr lang="en-US" smtClean="0"/>
-              <a:t>1/12/2022</a:t>
+              <a:t>1/22/2022</a:t>
             </a:fld>
             <a:endParaRPr lang="en-US"/>
           </a:p>
@@ -3949,7 +4040,7 @@
           <a:p>
             <a:fld id="{A533CBE2-D5BE-47AC-ADC2-9CDFC1D0CF90}" type="datetime1">
               <a:rPr lang="en-US" smtClean="0"/>
-              <a:t>1/12/2022</a:t>
+              <a:t>1/22/2022</a:t>
             </a:fld>
             <a:endParaRPr lang="en-US"/>
           </a:p>
@@ -4250,7 +4341,7 @@
           <a:p>
             <a:fld id="{39B7EDB1-CE74-4951-85A2-0B01C2128E28}" type="datetime1">
               <a:rPr lang="en-US" smtClean="0"/>
-              <a:t>1/12/2022</a:t>
+              <a:t>1/22/2022</a:t>
             </a:fld>
             <a:endParaRPr lang="en-US"/>
           </a:p>
@@ -4698,7 +4789,7 @@
           <a:p>
             <a:fld id="{2BC7EB92-A5C2-4807-A9DC-9EDE6CBFB241}" type="datetime1">
               <a:rPr lang="en-US" smtClean="0"/>
-              <a:t>1/12/2022</a:t>
+              <a:t>1/22/2022</a:t>
             </a:fld>
             <a:endParaRPr lang="en-US"/>
           </a:p>
@@ -4811,7 +4902,7 @@
           <a:p>
             <a:fld id="{2B7B7EE0-7771-4CD5-9B2B-3550753A54A1}" type="datetime1">
               <a:rPr lang="en-US" smtClean="0"/>
-              <a:t>1/12/2022</a:t>
+              <a:t>1/22/2022</a:t>
             </a:fld>
             <a:endParaRPr lang="en-US"/>
           </a:p>
@@ -5122,7 +5213,7 @@
           <a:p>
             <a:fld id="{F8B318B3-0E87-4416-A9B8-D891968C2727}" type="datetime1">
               <a:rPr lang="en-US" smtClean="0"/>
-              <a:t>1/12/2022</a:t>
+              <a:t>1/22/2022</a:t>
             </a:fld>
             <a:endParaRPr lang="en-US"/>
           </a:p>
@@ -5363,7 +5454,7 @@
           <a:p>
             <a:fld id="{54D997E8-DDEE-43F1-8D9B-F8A1E11DE488}" type="datetime1">
               <a:rPr lang="en-US" smtClean="0"/>
-              <a:t>1/12/2022</a:t>
+              <a:t>1/22/2022</a:t>
             </a:fld>
             <a:endParaRPr lang="en-US"/>
           </a:p>
@@ -6471,7 +6562,7 @@
           <p:cNvPr id="2" name="Title 1">
             <a:extLst>
               <a:ext uri="{FF2B5EF4-FFF2-40B4-BE49-F238E27FC236}">
-                <a16:creationId xmlns:a16="http://schemas.microsoft.com/office/drawing/2014/main" id="{BC827D48-865A-456B-B5A2-4B71B7188377}"/>
+                <a16:creationId xmlns:a16="http://schemas.microsoft.com/office/drawing/2014/main" id="{69E06EB5-8F04-497E-B8E1-BAD48536BC2C}"/>
               </a:ext>
             </a:extLst>
           </p:cNvPr>
@@ -6488,18 +6579,19 @@
           <a:lstStyle/>
           <a:p>
             <a:r>
-              <a:rPr lang="en-US" dirty="0"/>
-              <a:t>Plugin Examples</a:t>
-            </a:r>
-          </a:p>
-        </p:txBody>
-      </p:sp>
-      <p:sp>
-        <p:nvSpPr>
-          <p:cNvPr id="3" name="Content Placeholder 2">
-            <a:extLst>
-              <a:ext uri="{FF2B5EF4-FFF2-40B4-BE49-F238E27FC236}">
-                <a16:creationId xmlns:a16="http://schemas.microsoft.com/office/drawing/2014/main" id="{32221941-0524-483D-BC8D-30E2A737946E}"/>
+              <a:rPr lang="en-US"/>
+              <a:t>Analogy: Affordances</a:t>
+            </a:r>
+            <a:endParaRPr lang="en-US" dirty="0"/>
+          </a:p>
+        </p:txBody>
+      </p:sp>
+      <p:sp>
+        <p:nvSpPr>
+          <p:cNvPr id="6" name="Content Placeholder 5">
+            <a:extLst>
+              <a:ext uri="{FF2B5EF4-FFF2-40B4-BE49-F238E27FC236}">
+                <a16:creationId xmlns:a16="http://schemas.microsoft.com/office/drawing/2014/main" id="{52F89A5F-6765-4316-8A54-4CCB9DFD7230}"/>
               </a:ext>
             </a:extLst>
           </p:cNvPr>
@@ -6512,43 +6604,57 @@
         </p:nvSpPr>
         <p:spPr>
           <a:xfrm>
-            <a:off x="838200" y="1500160"/>
-            <a:ext cx="8594188" cy="4351338"/>
+            <a:off x="838200" y="1674415"/>
+            <a:ext cx="5465064" cy="4351338"/>
           </a:xfrm>
         </p:spPr>
         <p:txBody>
-          <a:bodyPr/>
-          <a:lstStyle/>
-          <a:p>
-            <a:r>
-              <a:rPr lang="en-US" dirty="0"/>
-              <a:t>Many examples:</a:t>
+          <a:bodyPr>
+            <a:normAutofit fontScale="92500" lnSpcReduction="10000"/>
+          </a:bodyPr>
+          <a:lstStyle/>
+          <a:p>
+            <a:r>
+              <a:rPr lang="en-US" dirty="0"/>
+              <a:t>An “affordance” is a property of an object that enables some operation to be performed with/on that object</a:t>
             </a:r>
           </a:p>
           <a:p>
             <a:pPr lvl="1"/>
             <a:r>
-              <a:rPr lang="en-US" dirty="0"/>
-              <a:t>Visual Studio Code (internal org. + extension marketplace)</a:t>
+              <a:rPr lang="en-US" dirty="0" err="1"/>
+              <a:t>Eg</a:t>
+            </a:r>
+            <a:r>
+              <a:rPr lang="en-US" dirty="0"/>
+              <a:t>: zipper handles enable opening/closing</a:t>
             </a:r>
           </a:p>
           <a:p>
             <a:pPr lvl="1"/>
             <a:r>
               <a:rPr lang="en-US" dirty="0"/>
-              <a:t>emacs (emacs-lisp + hooks)</a:t>
+              <a:t>Door handles enable opening/closing</a:t>
             </a:r>
           </a:p>
           <a:p>
             <a:pPr lvl="1"/>
             <a:r>
               <a:rPr lang="en-US" dirty="0"/>
-              <a:t>git clients</a:t>
-            </a:r>
-          </a:p>
-          <a:p>
-            <a:pPr lvl="1"/>
-            <a:endParaRPr lang="en-US" dirty="0"/>
+              <a:t>Spouts enable pouring</a:t>
+            </a:r>
+          </a:p>
+          <a:p>
+            <a:r>
+              <a:rPr lang="en-US" dirty="0"/>
+              <a:t>In a microkernel architecture, the core contains affordances for extension</a:t>
+            </a:r>
+          </a:p>
+          <a:p>
+            <a:r>
+              <a:rPr lang="en-US" dirty="0"/>
+              <a:t>These affordances may have many possible forms</a:t>
+            </a:r>
           </a:p>
         </p:txBody>
       </p:sp>
@@ -6557,7 +6663,7 @@
           <p:cNvPr id="4" name="Slide Number Placeholder 3">
             <a:extLst>
               <a:ext uri="{FF2B5EF4-FFF2-40B4-BE49-F238E27FC236}">
-                <a16:creationId xmlns:a16="http://schemas.microsoft.com/office/drawing/2014/main" id="{2E2C4ADF-5976-4227-821B-C68F3EB6FAAF}"/>
+                <a16:creationId xmlns:a16="http://schemas.microsoft.com/office/drawing/2014/main" id="{5D2EDE44-7B18-47DA-B7DF-74618AA294E5}"/>
               </a:ext>
             </a:extLst>
           </p:cNvPr>
@@ -6575,274 +6681,63 @@
           <a:p>
             <a:fld id="{20F37917-FD3A-4669-9018-DA04BCDD3D75}" type="slidenum">
               <a:rPr lang="en-US" smtClean="0"/>
-              <a:pPr/>
               <a:t>13</a:t>
             </a:fld>
             <a:endParaRPr lang="en-US"/>
           </a:p>
         </p:txBody>
       </p:sp>
-      <p:sp>
-        <p:nvSpPr>
-          <p:cNvPr id="8" name="Rectangle 7">
-            <a:extLst>
-              <a:ext uri="{FF2B5EF4-FFF2-40B4-BE49-F238E27FC236}">
-                <a16:creationId xmlns:a16="http://schemas.microsoft.com/office/drawing/2014/main" id="{206C54B8-FC37-476B-9824-6C02CEDE32E4}"/>
-              </a:ext>
-            </a:extLst>
-          </p:cNvPr>
-          <p:cNvSpPr/>
+      <p:pic>
+        <p:nvPicPr>
+          <p:cNvPr id="7" name="Picture 6">
+            <a:extLst>
+              <a:ext uri="{FF2B5EF4-FFF2-40B4-BE49-F238E27FC236}">
+                <a16:creationId xmlns:a16="http://schemas.microsoft.com/office/drawing/2014/main" id="{4E894CCC-33A1-471B-BFB3-43B36DA13EE9}"/>
+              </a:ext>
+            </a:extLst>
+          </p:cNvPr>
+          <p:cNvPicPr>
+            <a:picLocks noChangeAspect="1" noChangeArrowheads="1"/>
+          </p:cNvPicPr>
           <p:nvPr/>
-        </p:nvSpPr>
-        <p:spPr>
+        </p:nvPicPr>
+        <p:blipFill>
+          <a:blip r:embed="rId3">
+            <a:extLst>
+              <a:ext uri="{28A0092B-C50C-407E-A947-70E740481C1C}">
+                <a14:useLocalDpi xmlns:a14="http://schemas.microsoft.com/office/drawing/2010/main" val="0"/>
+              </a:ext>
+            </a:extLst>
+          </a:blip>
+          <a:srcRect/>
+          <a:stretch>
+            <a:fillRect/>
+          </a:stretch>
+        </p:blipFill>
+        <p:spPr bwMode="auto">
           <a:xfrm>
-            <a:off x="635000" y="3675829"/>
-            <a:ext cx="11231419" cy="1477328"/>
+            <a:off x="6924501" y="1781157"/>
+            <a:ext cx="4394247" cy="3295685"/>
           </a:xfrm>
           <a:prstGeom prst="rect">
             <a:avLst/>
           </a:prstGeom>
-          <a:solidFill>
-            <a:schemeClr val="accent6">
-              <a:lumMod val="20000"/>
-              <a:lumOff val="80000"/>
-            </a:schemeClr>
-          </a:solidFill>
+          <a:noFill/>
+          <a:extLst>
+            <a:ext uri="{909E8E84-426E-40DD-AFC4-6F175D3DCCD1}">
+              <a14:hiddenFill xmlns:a14="http://schemas.microsoft.com/office/drawing/2010/main">
+                <a:solidFill>
+                  <a:srgbClr val="FFFFFF"/>
+                </a:solidFill>
+              </a14:hiddenFill>
+            </a:ext>
+          </a:extLst>
         </p:spPr>
-        <p:txBody>
-          <a:bodyPr wrap="square">
-            <a:spAutoFit/>
-          </a:bodyPr>
-          <a:lstStyle/>
-          <a:p>
-            <a:r>
-              <a:rPr lang="en-US" dirty="0">
-                <a:solidFill>
-                  <a:prstClr val="black"/>
-                </a:solidFill>
-                <a:latin typeface="Lucida Console" panose="020B0609040504020204" pitchFamily="49" charset="0"/>
-              </a:rPr>
-              <a:t>$ ls .git/hooks</a:t>
-            </a:r>
-          </a:p>
-          <a:p>
-            <a:r>
-              <a:rPr lang="en-US" dirty="0" err="1">
-                <a:solidFill>
-                  <a:prstClr val="black"/>
-                </a:solidFill>
-                <a:latin typeface="Lucida Console" panose="020B0609040504020204" pitchFamily="49" charset="0"/>
-              </a:rPr>
-              <a:t>applypatch-msg.sample</a:t>
-            </a:r>
-            <a:r>
-              <a:rPr lang="en-US" dirty="0">
-                <a:solidFill>
-                  <a:prstClr val="black"/>
-                </a:solidFill>
-                <a:latin typeface="Lucida Console" panose="020B0609040504020204" pitchFamily="49" charset="0"/>
-              </a:rPr>
-              <a:t>      pre-</a:t>
-            </a:r>
-            <a:r>
-              <a:rPr lang="en-US" dirty="0" err="1">
-                <a:solidFill>
-                  <a:prstClr val="black"/>
-                </a:solidFill>
-                <a:latin typeface="Lucida Console" panose="020B0609040504020204" pitchFamily="49" charset="0"/>
-              </a:rPr>
-              <a:t>applypatch.sample</a:t>
-            </a:r>
-            <a:r>
-              <a:rPr lang="en-US" dirty="0">
-                <a:solidFill>
-                  <a:prstClr val="black"/>
-                </a:solidFill>
-                <a:latin typeface="Lucida Console" panose="020B0609040504020204" pitchFamily="49" charset="0"/>
-              </a:rPr>
-              <a:t>      pre-</a:t>
-            </a:r>
-            <a:r>
-              <a:rPr lang="en-US" dirty="0" err="1">
-                <a:solidFill>
-                  <a:prstClr val="black"/>
-                </a:solidFill>
-                <a:latin typeface="Lucida Console" panose="020B0609040504020204" pitchFamily="49" charset="0"/>
-              </a:rPr>
-              <a:t>rebase.sample</a:t>
-            </a:r>
-            <a:endParaRPr lang="en-US" dirty="0">
-              <a:solidFill>
-                <a:prstClr val="black"/>
-              </a:solidFill>
-              <a:latin typeface="Lucida Console" panose="020B0609040504020204" pitchFamily="49" charset="0"/>
-            </a:endParaRPr>
-          </a:p>
-          <a:p>
-            <a:r>
-              <a:rPr lang="en-US" dirty="0">
-                <a:solidFill>
-                  <a:prstClr val="black"/>
-                </a:solidFill>
-                <a:latin typeface="Lucida Console" panose="020B0609040504020204" pitchFamily="49" charset="0"/>
-              </a:rPr>
-              <a:t>commit-</a:t>
-            </a:r>
-            <a:r>
-              <a:rPr lang="en-US" dirty="0" err="1">
-                <a:solidFill>
-                  <a:prstClr val="black"/>
-                </a:solidFill>
-                <a:latin typeface="Lucida Console" panose="020B0609040504020204" pitchFamily="49" charset="0"/>
-              </a:rPr>
-              <a:t>msg.sample</a:t>
-            </a:r>
-            <a:r>
-              <a:rPr lang="en-US" dirty="0">
-                <a:solidFill>
-                  <a:prstClr val="black"/>
-                </a:solidFill>
-                <a:latin typeface="Lucida Console" panose="020B0609040504020204" pitchFamily="49" charset="0"/>
-              </a:rPr>
-              <a:t>          pre-</a:t>
-            </a:r>
-            <a:r>
-              <a:rPr lang="en-US" dirty="0" err="1">
-                <a:solidFill>
-                  <a:prstClr val="black"/>
-                </a:solidFill>
-                <a:latin typeface="Lucida Console" panose="020B0609040504020204" pitchFamily="49" charset="0"/>
-              </a:rPr>
-              <a:t>commit.sample</a:t>
-            </a:r>
-            <a:r>
-              <a:rPr lang="en-US" dirty="0">
-                <a:solidFill>
-                  <a:prstClr val="black"/>
-                </a:solidFill>
-                <a:latin typeface="Lucida Console" panose="020B0609040504020204" pitchFamily="49" charset="0"/>
-              </a:rPr>
-              <a:t>          pre-</a:t>
-            </a:r>
-            <a:r>
-              <a:rPr lang="en-US" dirty="0" err="1">
-                <a:solidFill>
-                  <a:prstClr val="black"/>
-                </a:solidFill>
-                <a:latin typeface="Lucida Console" panose="020B0609040504020204" pitchFamily="49" charset="0"/>
-              </a:rPr>
-              <a:t>receive.sample</a:t>
-            </a:r>
-            <a:endParaRPr lang="en-US" dirty="0">
-              <a:solidFill>
-                <a:prstClr val="black"/>
-              </a:solidFill>
-              <a:latin typeface="Lucida Console" panose="020B0609040504020204" pitchFamily="49" charset="0"/>
-            </a:endParaRPr>
-          </a:p>
-          <a:p>
-            <a:r>
-              <a:rPr lang="en-US" dirty="0" err="1">
-                <a:solidFill>
-                  <a:prstClr val="black"/>
-                </a:solidFill>
-                <a:latin typeface="Lucida Console" panose="020B0609040504020204" pitchFamily="49" charset="0"/>
-              </a:rPr>
-              <a:t>fsmonitor-watchman.sample</a:t>
-            </a:r>
-            <a:r>
-              <a:rPr lang="en-US" dirty="0">
-                <a:solidFill>
-                  <a:prstClr val="black"/>
-                </a:solidFill>
-                <a:latin typeface="Lucida Console" panose="020B0609040504020204" pitchFamily="49" charset="0"/>
-              </a:rPr>
-              <a:t>  prepare-commit-</a:t>
-            </a:r>
-            <a:r>
-              <a:rPr lang="en-US" dirty="0" err="1">
-                <a:solidFill>
-                  <a:prstClr val="black"/>
-                </a:solidFill>
-                <a:latin typeface="Lucida Console" panose="020B0609040504020204" pitchFamily="49" charset="0"/>
-              </a:rPr>
-              <a:t>msg.sample</a:t>
-            </a:r>
-            <a:r>
-              <a:rPr lang="en-US" dirty="0">
-                <a:solidFill>
-                  <a:prstClr val="black"/>
-                </a:solidFill>
-                <a:latin typeface="Lucida Console" panose="020B0609040504020204" pitchFamily="49" charset="0"/>
-              </a:rPr>
-              <a:t>  </a:t>
-            </a:r>
-            <a:r>
-              <a:rPr lang="en-US" dirty="0" err="1">
-                <a:solidFill>
-                  <a:prstClr val="black"/>
-                </a:solidFill>
-                <a:latin typeface="Lucida Console" panose="020B0609040504020204" pitchFamily="49" charset="0"/>
-              </a:rPr>
-              <a:t>update.sample</a:t>
-            </a:r>
-            <a:endParaRPr lang="en-US" dirty="0">
-              <a:solidFill>
-                <a:prstClr val="black"/>
-              </a:solidFill>
-              <a:latin typeface="Lucida Console" panose="020B0609040504020204" pitchFamily="49" charset="0"/>
-            </a:endParaRPr>
-          </a:p>
-          <a:p>
-            <a:r>
-              <a:rPr lang="en-US" dirty="0">
-                <a:solidFill>
-                  <a:prstClr val="black"/>
-                </a:solidFill>
-                <a:latin typeface="Lucida Console" panose="020B0609040504020204" pitchFamily="49" charset="0"/>
-              </a:rPr>
-              <a:t>post-</a:t>
-            </a:r>
-            <a:r>
-              <a:rPr lang="en-US" dirty="0" err="1">
-                <a:solidFill>
-                  <a:prstClr val="black"/>
-                </a:solidFill>
-                <a:latin typeface="Lucida Console" panose="020B0609040504020204" pitchFamily="49" charset="0"/>
-              </a:rPr>
-              <a:t>update.sample</a:t>
-            </a:r>
-            <a:r>
-              <a:rPr lang="en-US" dirty="0">
-                <a:solidFill>
-                  <a:prstClr val="black"/>
-                </a:solidFill>
-                <a:latin typeface="Lucida Console" panose="020B0609040504020204" pitchFamily="49" charset="0"/>
-              </a:rPr>
-              <a:t>         pre-</a:t>
-            </a:r>
-            <a:r>
-              <a:rPr lang="en-US" dirty="0" err="1">
-                <a:solidFill>
-                  <a:prstClr val="black"/>
-                </a:solidFill>
-                <a:latin typeface="Lucida Console" panose="020B0609040504020204" pitchFamily="49" charset="0"/>
-              </a:rPr>
-              <a:t>push.sample</a:t>
-            </a:r>
-            <a:endParaRPr lang="en-US" dirty="0">
-              <a:solidFill>
-                <a:prstClr val="black"/>
-              </a:solidFill>
-              <a:latin typeface="Lucida Console" panose="020B0609040504020204" pitchFamily="49" charset="0"/>
-            </a:endParaRPr>
-          </a:p>
-        </p:txBody>
-      </p:sp>
+      </p:pic>
     </p:spTree>
     <p:extLst>
       <p:ext uri="{BB962C8B-B14F-4D97-AF65-F5344CB8AC3E}">
-        <p14:creationId xmlns:p14="http://schemas.microsoft.com/office/powerpoint/2010/main" val="125374142"/>
+        <p14:creationId xmlns:p14="http://schemas.microsoft.com/office/powerpoint/2010/main" val="414894705"/>
       </p:ext>
     </p:extLst>
   </p:cSld>
@@ -6874,6 +6769,409 @@
           <p:cNvPr id="2" name="Title 1">
             <a:extLst>
               <a:ext uri="{FF2B5EF4-FFF2-40B4-BE49-F238E27FC236}">
+                <a16:creationId xmlns:a16="http://schemas.microsoft.com/office/drawing/2014/main" id="{BC827D48-865A-456B-B5A2-4B71B7188377}"/>
+              </a:ext>
+            </a:extLst>
+          </p:cNvPr>
+          <p:cNvSpPr>
+            <a:spLocks noGrp="1"/>
+          </p:cNvSpPr>
+          <p:nvPr>
+            <p:ph type="title"/>
+          </p:nvPr>
+        </p:nvSpPr>
+        <p:spPr/>
+        <p:txBody>
+          <a:bodyPr/>
+          <a:lstStyle/>
+          <a:p>
+            <a:r>
+              <a:rPr lang="en-US" dirty="0"/>
+              <a:t>Plugin Examples</a:t>
+            </a:r>
+          </a:p>
+        </p:txBody>
+      </p:sp>
+      <p:sp>
+        <p:nvSpPr>
+          <p:cNvPr id="3" name="Content Placeholder 2">
+            <a:extLst>
+              <a:ext uri="{FF2B5EF4-FFF2-40B4-BE49-F238E27FC236}">
+                <a16:creationId xmlns:a16="http://schemas.microsoft.com/office/drawing/2014/main" id="{32221941-0524-483D-BC8D-30E2A737946E}"/>
+              </a:ext>
+            </a:extLst>
+          </p:cNvPr>
+          <p:cNvSpPr>
+            <a:spLocks noGrp="1"/>
+          </p:cNvSpPr>
+          <p:nvPr>
+            <p:ph idx="1"/>
+          </p:nvPr>
+        </p:nvSpPr>
+        <p:spPr>
+          <a:xfrm>
+            <a:off x="838200" y="1500160"/>
+            <a:ext cx="8594188" cy="4351338"/>
+          </a:xfrm>
+        </p:spPr>
+        <p:txBody>
+          <a:bodyPr/>
+          <a:lstStyle/>
+          <a:p>
+            <a:r>
+              <a:rPr lang="en-US" dirty="0"/>
+              <a:t>Many examples:</a:t>
+            </a:r>
+          </a:p>
+          <a:p>
+            <a:pPr lvl="1"/>
+            <a:r>
+              <a:rPr lang="en-US" dirty="0"/>
+              <a:t>Visual Studio Code (internal org. + extension marketplace)</a:t>
+            </a:r>
+          </a:p>
+          <a:p>
+            <a:pPr lvl="1"/>
+            <a:r>
+              <a:rPr lang="en-US" dirty="0"/>
+              <a:t>emacs (emacs-lisp + hooks)</a:t>
+            </a:r>
+          </a:p>
+          <a:p>
+            <a:pPr lvl="1"/>
+            <a:r>
+              <a:rPr lang="en-US" dirty="0"/>
+              <a:t>git clients</a:t>
+            </a:r>
+          </a:p>
+          <a:p>
+            <a:pPr lvl="1"/>
+            <a:endParaRPr lang="en-US" dirty="0"/>
+          </a:p>
+        </p:txBody>
+      </p:sp>
+      <p:sp>
+        <p:nvSpPr>
+          <p:cNvPr id="4" name="Slide Number Placeholder 3">
+            <a:extLst>
+              <a:ext uri="{FF2B5EF4-FFF2-40B4-BE49-F238E27FC236}">
+                <a16:creationId xmlns:a16="http://schemas.microsoft.com/office/drawing/2014/main" id="{2E2C4ADF-5976-4227-821B-C68F3EB6FAAF}"/>
+              </a:ext>
+            </a:extLst>
+          </p:cNvPr>
+          <p:cNvSpPr>
+            <a:spLocks noGrp="1"/>
+          </p:cNvSpPr>
+          <p:nvPr>
+            <p:ph type="sldNum" sz="quarter" idx="12"/>
+          </p:nvPr>
+        </p:nvSpPr>
+        <p:spPr/>
+        <p:txBody>
+          <a:bodyPr/>
+          <a:lstStyle/>
+          <a:p>
+            <a:fld id="{20F37917-FD3A-4669-9018-DA04BCDD3D75}" type="slidenum">
+              <a:rPr lang="en-US" smtClean="0"/>
+              <a:pPr/>
+              <a:t>14</a:t>
+            </a:fld>
+            <a:endParaRPr lang="en-US"/>
+          </a:p>
+        </p:txBody>
+      </p:sp>
+      <p:sp>
+        <p:nvSpPr>
+          <p:cNvPr id="8" name="Rectangle 7">
+            <a:extLst>
+              <a:ext uri="{FF2B5EF4-FFF2-40B4-BE49-F238E27FC236}">
+                <a16:creationId xmlns:a16="http://schemas.microsoft.com/office/drawing/2014/main" id="{206C54B8-FC37-476B-9824-6C02CEDE32E4}"/>
+              </a:ext>
+            </a:extLst>
+          </p:cNvPr>
+          <p:cNvSpPr/>
+          <p:nvPr/>
+        </p:nvSpPr>
+        <p:spPr>
+          <a:xfrm>
+            <a:off x="635000" y="3675829"/>
+            <a:ext cx="11231419" cy="1477328"/>
+          </a:xfrm>
+          <a:prstGeom prst="rect">
+            <a:avLst/>
+          </a:prstGeom>
+          <a:solidFill>
+            <a:schemeClr val="accent6">
+              <a:lumMod val="20000"/>
+              <a:lumOff val="80000"/>
+            </a:schemeClr>
+          </a:solidFill>
+        </p:spPr>
+        <p:txBody>
+          <a:bodyPr wrap="square">
+            <a:spAutoFit/>
+          </a:bodyPr>
+          <a:lstStyle/>
+          <a:p>
+            <a:r>
+              <a:rPr lang="en-US" dirty="0">
+                <a:solidFill>
+                  <a:prstClr val="black"/>
+                </a:solidFill>
+                <a:latin typeface="Lucida Console" panose="020B0609040504020204" pitchFamily="49" charset="0"/>
+              </a:rPr>
+              <a:t>$ ls .git/hooks</a:t>
+            </a:r>
+          </a:p>
+          <a:p>
+            <a:r>
+              <a:rPr lang="en-US" dirty="0" err="1">
+                <a:solidFill>
+                  <a:prstClr val="black"/>
+                </a:solidFill>
+                <a:latin typeface="Lucida Console" panose="020B0609040504020204" pitchFamily="49" charset="0"/>
+              </a:rPr>
+              <a:t>applypatch-msg.sample</a:t>
+            </a:r>
+            <a:r>
+              <a:rPr lang="en-US" dirty="0">
+                <a:solidFill>
+                  <a:prstClr val="black"/>
+                </a:solidFill>
+                <a:latin typeface="Lucida Console" panose="020B0609040504020204" pitchFamily="49" charset="0"/>
+              </a:rPr>
+              <a:t>      pre-</a:t>
+            </a:r>
+            <a:r>
+              <a:rPr lang="en-US" dirty="0" err="1">
+                <a:solidFill>
+                  <a:prstClr val="black"/>
+                </a:solidFill>
+                <a:latin typeface="Lucida Console" panose="020B0609040504020204" pitchFamily="49" charset="0"/>
+              </a:rPr>
+              <a:t>applypatch.sample</a:t>
+            </a:r>
+            <a:r>
+              <a:rPr lang="en-US" dirty="0">
+                <a:solidFill>
+                  <a:prstClr val="black"/>
+                </a:solidFill>
+                <a:latin typeface="Lucida Console" panose="020B0609040504020204" pitchFamily="49" charset="0"/>
+              </a:rPr>
+              <a:t>      pre-</a:t>
+            </a:r>
+            <a:r>
+              <a:rPr lang="en-US" dirty="0" err="1">
+                <a:solidFill>
+                  <a:prstClr val="black"/>
+                </a:solidFill>
+                <a:latin typeface="Lucida Console" panose="020B0609040504020204" pitchFamily="49" charset="0"/>
+              </a:rPr>
+              <a:t>rebase.sample</a:t>
+            </a:r>
+            <a:endParaRPr lang="en-US" dirty="0">
+              <a:solidFill>
+                <a:prstClr val="black"/>
+              </a:solidFill>
+              <a:latin typeface="Lucida Console" panose="020B0609040504020204" pitchFamily="49" charset="0"/>
+            </a:endParaRPr>
+          </a:p>
+          <a:p>
+            <a:r>
+              <a:rPr lang="en-US" dirty="0">
+                <a:solidFill>
+                  <a:prstClr val="black"/>
+                </a:solidFill>
+                <a:latin typeface="Lucida Console" panose="020B0609040504020204" pitchFamily="49" charset="0"/>
+              </a:rPr>
+              <a:t>commit-</a:t>
+            </a:r>
+            <a:r>
+              <a:rPr lang="en-US" dirty="0" err="1">
+                <a:solidFill>
+                  <a:prstClr val="black"/>
+                </a:solidFill>
+                <a:latin typeface="Lucida Console" panose="020B0609040504020204" pitchFamily="49" charset="0"/>
+              </a:rPr>
+              <a:t>msg.sample</a:t>
+            </a:r>
+            <a:r>
+              <a:rPr lang="en-US" dirty="0">
+                <a:solidFill>
+                  <a:prstClr val="black"/>
+                </a:solidFill>
+                <a:latin typeface="Lucida Console" panose="020B0609040504020204" pitchFamily="49" charset="0"/>
+              </a:rPr>
+              <a:t>          pre-</a:t>
+            </a:r>
+            <a:r>
+              <a:rPr lang="en-US" dirty="0" err="1">
+                <a:solidFill>
+                  <a:prstClr val="black"/>
+                </a:solidFill>
+                <a:latin typeface="Lucida Console" panose="020B0609040504020204" pitchFamily="49" charset="0"/>
+              </a:rPr>
+              <a:t>commit.sample</a:t>
+            </a:r>
+            <a:r>
+              <a:rPr lang="en-US" dirty="0">
+                <a:solidFill>
+                  <a:prstClr val="black"/>
+                </a:solidFill>
+                <a:latin typeface="Lucida Console" panose="020B0609040504020204" pitchFamily="49" charset="0"/>
+              </a:rPr>
+              <a:t>          pre-</a:t>
+            </a:r>
+            <a:r>
+              <a:rPr lang="en-US" dirty="0" err="1">
+                <a:solidFill>
+                  <a:prstClr val="black"/>
+                </a:solidFill>
+                <a:latin typeface="Lucida Console" panose="020B0609040504020204" pitchFamily="49" charset="0"/>
+              </a:rPr>
+              <a:t>receive.sample</a:t>
+            </a:r>
+            <a:endParaRPr lang="en-US" dirty="0">
+              <a:solidFill>
+                <a:prstClr val="black"/>
+              </a:solidFill>
+              <a:latin typeface="Lucida Console" panose="020B0609040504020204" pitchFamily="49" charset="0"/>
+            </a:endParaRPr>
+          </a:p>
+          <a:p>
+            <a:r>
+              <a:rPr lang="en-US" dirty="0" err="1">
+                <a:solidFill>
+                  <a:prstClr val="black"/>
+                </a:solidFill>
+                <a:latin typeface="Lucida Console" panose="020B0609040504020204" pitchFamily="49" charset="0"/>
+              </a:rPr>
+              <a:t>fsmonitor-watchman.sample</a:t>
+            </a:r>
+            <a:r>
+              <a:rPr lang="en-US" dirty="0">
+                <a:solidFill>
+                  <a:prstClr val="black"/>
+                </a:solidFill>
+                <a:latin typeface="Lucida Console" panose="020B0609040504020204" pitchFamily="49" charset="0"/>
+              </a:rPr>
+              <a:t>  prepare-commit-</a:t>
+            </a:r>
+            <a:r>
+              <a:rPr lang="en-US" dirty="0" err="1">
+                <a:solidFill>
+                  <a:prstClr val="black"/>
+                </a:solidFill>
+                <a:latin typeface="Lucida Console" panose="020B0609040504020204" pitchFamily="49" charset="0"/>
+              </a:rPr>
+              <a:t>msg.sample</a:t>
+            </a:r>
+            <a:r>
+              <a:rPr lang="en-US" dirty="0">
+                <a:solidFill>
+                  <a:prstClr val="black"/>
+                </a:solidFill>
+                <a:latin typeface="Lucida Console" panose="020B0609040504020204" pitchFamily="49" charset="0"/>
+              </a:rPr>
+              <a:t>  </a:t>
+            </a:r>
+            <a:r>
+              <a:rPr lang="en-US" dirty="0" err="1">
+                <a:solidFill>
+                  <a:prstClr val="black"/>
+                </a:solidFill>
+                <a:latin typeface="Lucida Console" panose="020B0609040504020204" pitchFamily="49" charset="0"/>
+              </a:rPr>
+              <a:t>update.sample</a:t>
+            </a:r>
+            <a:endParaRPr lang="en-US" dirty="0">
+              <a:solidFill>
+                <a:prstClr val="black"/>
+              </a:solidFill>
+              <a:latin typeface="Lucida Console" panose="020B0609040504020204" pitchFamily="49" charset="0"/>
+            </a:endParaRPr>
+          </a:p>
+          <a:p>
+            <a:r>
+              <a:rPr lang="en-US" dirty="0">
+                <a:solidFill>
+                  <a:prstClr val="black"/>
+                </a:solidFill>
+                <a:latin typeface="Lucida Console" panose="020B0609040504020204" pitchFamily="49" charset="0"/>
+              </a:rPr>
+              <a:t>post-</a:t>
+            </a:r>
+            <a:r>
+              <a:rPr lang="en-US" dirty="0" err="1">
+                <a:solidFill>
+                  <a:prstClr val="black"/>
+                </a:solidFill>
+                <a:latin typeface="Lucida Console" panose="020B0609040504020204" pitchFamily="49" charset="0"/>
+              </a:rPr>
+              <a:t>update.sample</a:t>
+            </a:r>
+            <a:r>
+              <a:rPr lang="en-US" dirty="0">
+                <a:solidFill>
+                  <a:prstClr val="black"/>
+                </a:solidFill>
+                <a:latin typeface="Lucida Console" panose="020B0609040504020204" pitchFamily="49" charset="0"/>
+              </a:rPr>
+              <a:t>         pre-</a:t>
+            </a:r>
+            <a:r>
+              <a:rPr lang="en-US" dirty="0" err="1">
+                <a:solidFill>
+                  <a:prstClr val="black"/>
+                </a:solidFill>
+                <a:latin typeface="Lucida Console" panose="020B0609040504020204" pitchFamily="49" charset="0"/>
+              </a:rPr>
+              <a:t>push.sample</a:t>
+            </a:r>
+            <a:endParaRPr lang="en-US" dirty="0">
+              <a:solidFill>
+                <a:prstClr val="black"/>
+              </a:solidFill>
+              <a:latin typeface="Lucida Console" panose="020B0609040504020204" pitchFamily="49" charset="0"/>
+            </a:endParaRPr>
+          </a:p>
+        </p:txBody>
+      </p:sp>
+    </p:spTree>
+    <p:extLst>
+      <p:ext uri="{BB962C8B-B14F-4D97-AF65-F5344CB8AC3E}">
+        <p14:creationId xmlns:p14="http://schemas.microsoft.com/office/powerpoint/2010/main" val="125374142"/>
+      </p:ext>
+    </p:extLst>
+  </p:cSld>
+  <p:clrMapOvr>
+    <a:masterClrMapping/>
+  </p:clrMapOvr>
+</p:sld>
+</file>
+
+<file path=ppt/slides/slide15.xml><?xml version="1.0" encoding="utf-8"?>
+<p:sld xmlns:a="http://schemas.openxmlformats.org/drawingml/2006/main" xmlns:r="http://schemas.openxmlformats.org/officeDocument/2006/relationships" xmlns:p="http://schemas.openxmlformats.org/presentationml/2006/main">
+  <p:cSld>
+    <p:spTree>
+      <p:nvGrpSpPr>
+        <p:cNvPr id="1" name=""/>
+        <p:cNvGrpSpPr/>
+        <p:nvPr/>
+      </p:nvGrpSpPr>
+      <p:grpSpPr>
+        <a:xfrm>
+          <a:off x="0" y="0"/>
+          <a:ext cx="0" cy="0"/>
+          <a:chOff x="0" y="0"/>
+          <a:chExt cx="0" cy="0"/>
+        </a:xfrm>
+      </p:grpSpPr>
+      <p:sp>
+        <p:nvSpPr>
+          <p:cNvPr id="2" name="Title 1">
+            <a:extLst>
+              <a:ext uri="{FF2B5EF4-FFF2-40B4-BE49-F238E27FC236}">
                 <a16:creationId xmlns:a16="http://schemas.microsoft.com/office/drawing/2014/main" id="{F77B9B9D-546F-4244-84F2-75412D3541A1}"/>
               </a:ext>
             </a:extLst>
@@ -6985,7 +7283,7 @@
           <a:p>
             <a:fld id="{20F37917-FD3A-4669-9018-DA04BCDD3D75}" type="slidenum">
               <a:rPr lang="en-US" smtClean="0"/>
-              <a:t>14</a:t>
+              <a:t>15</a:t>
             </a:fld>
             <a:endParaRPr lang="en-US"/>
           </a:p>
@@ -7040,7 +7338,7 @@
 </p:sld>
 </file>
 
-<file path=ppt/slides/slide15.xml><?xml version="1.0" encoding="utf-8"?>
+<file path=ppt/slides/slide16.xml><?xml version="1.0" encoding="utf-8"?>
 <p:sld xmlns:a="http://schemas.openxmlformats.org/drawingml/2006/main" xmlns:r="http://schemas.openxmlformats.org/officeDocument/2006/relationships" xmlns:p="http://schemas.openxmlformats.org/presentationml/2006/main">
   <p:cSld>
     <p:spTree>
@@ -7115,7 +7413,7 @@
             <a:pPr lvl="1"/>
             <a:r>
               <a:rPr lang="en-US" dirty="0"/>
-              <a:t>Give 4 examples of software architectural styles and their distinguishing characteristics</a:t>
+              <a:t>Give 5 examples of software architectural styles and their distinguishing characteristics</a:t>
             </a:r>
           </a:p>
           <a:p>
@@ -7150,7 +7448,7 @@
           <a:p>
             <a:fld id="{20F37917-FD3A-4669-9018-DA04BCDD3D75}" type="slidenum">
               <a:rPr lang="en-US" smtClean="0"/>
-              <a:t>15</a:t>
+              <a:t>16</a:t>
             </a:fld>
             <a:endParaRPr lang="en-US"/>
           </a:p>
@@ -7244,7 +7542,7 @@
             <a:pPr lvl="1"/>
             <a:r>
               <a:rPr lang="en-US" dirty="0"/>
-              <a:t>Give 4 examples of software architectural styles and their distinguishing characteristics</a:t>
+              <a:t>Give 5 examples of software architectural styles and their distinguishing characteristics</a:t>
             </a:r>
           </a:p>
           <a:p>
@@ -7665,24 +7963,50 @@
           <a:bodyPr/>
           <a:lstStyle/>
           <a:p>
+            <a:pPr marL="514350" indent="-514350">
+              <a:buFont typeface="+mj-lt"/>
+              <a:buAutoNum type="arabicPeriod"/>
+            </a:pPr>
             <a:r>
               <a:rPr lang="en-US" dirty="0"/>
               <a:t>Object-oriented</a:t>
             </a:r>
           </a:p>
           <a:p>
+            <a:pPr marL="514350" indent="-514350">
+              <a:buFont typeface="+mj-lt"/>
+              <a:buAutoNum type="arabicPeriod"/>
+            </a:pPr>
             <a:r>
               <a:rPr lang="en-US" dirty="0"/>
               <a:t>Layered</a:t>
             </a:r>
           </a:p>
           <a:p>
+            <a:pPr marL="514350" indent="-514350">
+              <a:buFont typeface="+mj-lt"/>
+              <a:buAutoNum type="arabicPeriod"/>
+            </a:pPr>
             <a:r>
               <a:rPr lang="en-US" dirty="0"/>
               <a:t>Pipeline</a:t>
             </a:r>
           </a:p>
           <a:p>
+            <a:pPr marL="514350" indent="-514350">
+              <a:buFont typeface="+mj-lt"/>
+              <a:buAutoNum type="arabicPeriod"/>
+            </a:pPr>
+            <a:r>
+              <a:rPr lang="en-US" dirty="0"/>
+              <a:t>Microkernel</a:t>
+            </a:r>
+          </a:p>
+          <a:p>
+            <a:pPr marL="514350" indent="-514350">
+              <a:buFont typeface="+mj-lt"/>
+              <a:buAutoNum type="arabicPeriod"/>
+            </a:pPr>
             <a:r>
               <a:rPr lang="en-US" dirty="0"/>
               <a:t>Event-driven</a:t>

</xml_diff>

<commit_message>
incorporated Jon & Adeel's ideas for L2.1-2.2
</commit_message>
<xml_diff>
--- a/Slides/Lesson 2.2 The Architectural Scale.pptx
+++ b/Slides/Lesson 2.2 The Architectural Scale.pptx
@@ -5,7 +5,7 @@
     <p:sldMasterId id="2147483648" r:id="rId1"/>
   </p:sldMasterIdLst>
   <p:notesMasterIdLst>
-    <p:notesMasterId r:id="rId17"/>
+    <p:notesMasterId r:id="rId20"/>
   </p:notesMasterIdLst>
   <p:sldIdLst>
     <p:sldId id="485" r:id="rId2"/>
@@ -20,30 +20,33 @@
     <p:sldId id="419" r:id="rId11"/>
     <p:sldId id="420" r:id="rId12"/>
     <p:sldId id="421" r:id="rId13"/>
-    <p:sldId id="422" r:id="rId14"/>
-    <p:sldId id="424" r:id="rId15"/>
-    <p:sldId id="486" r:id="rId16"/>
+    <p:sldId id="487" r:id="rId14"/>
+    <p:sldId id="422" r:id="rId15"/>
+    <p:sldId id="488" r:id="rId16"/>
+    <p:sldId id="424" r:id="rId17"/>
+    <p:sldId id="489" r:id="rId18"/>
+    <p:sldId id="486" r:id="rId19"/>
   </p:sldIdLst>
   <p:sldSz cx="12192000" cy="6858000"/>
   <p:notesSz cx="6858000" cy="9144000"/>
   <p:embeddedFontLst>
     <p:embeddedFont>
       <p:font typeface="Calibri" panose="020F0502020204030204" pitchFamily="34" charset="0"/>
-      <p:regular r:id="rId18"/>
-      <p:bold r:id="rId19"/>
-      <p:italic r:id="rId20"/>
-      <p:boldItalic r:id="rId21"/>
+      <p:regular r:id="rId21"/>
+      <p:bold r:id="rId22"/>
+      <p:italic r:id="rId23"/>
+      <p:boldItalic r:id="rId24"/>
     </p:embeddedFont>
     <p:embeddedFont>
       <p:font typeface="Lucida Console" panose="020B0609040504020204" pitchFamily="49" charset="0"/>
-      <p:regular r:id="rId22"/>
+      <p:regular r:id="rId25"/>
     </p:embeddedFont>
     <p:embeddedFont>
       <p:font typeface="Verdana" panose="020B0604030504040204" pitchFamily="34" charset="0"/>
-      <p:regular r:id="rId23"/>
-      <p:bold r:id="rId24"/>
-      <p:italic r:id="rId25"/>
-      <p:boldItalic r:id="rId26"/>
+      <p:regular r:id="rId26"/>
+      <p:bold r:id="rId27"/>
+      <p:italic r:id="rId28"/>
+      <p:boldItalic r:id="rId29"/>
     </p:embeddedFont>
   </p:embeddedFontLst>
   <p:defaultTextStyle>
@@ -158,8 +161,11 @@
             <p14:sldId id="419"/>
             <p14:sldId id="420"/>
             <p14:sldId id="421"/>
+            <p14:sldId id="487"/>
             <p14:sldId id="422"/>
+            <p14:sldId id="488"/>
             <p14:sldId id="424"/>
+            <p14:sldId id="489"/>
             <p14:sldId id="486"/>
           </p14:sldIdLst>
         </p14:section>
@@ -254,7 +260,7 @@
           <a:p>
             <a:fld id="{7C7E5181-6CF5-45F7-A87A-E0E0B1FD7549}" type="datetimeFigureOut">
               <a:rPr lang="en-US" smtClean="0"/>
-              <a:t>1/12/2022</a:t>
+              <a:t>1/22/2022</a:t>
             </a:fld>
             <a:endParaRPr lang="en-US"/>
           </a:p>
@@ -922,10 +928,7 @@
           <a:bodyPr/>
           <a:lstStyle/>
           <a:p>
-            <a:r>
-              <a:rPr lang="en-US" dirty="0"/>
-              <a:t>Many popular systems use this architecture.   Visual Studio Code uses this architecture to allow users to build popular extensions.   Git provides modifications by allowing the user to substitute their own file in place of the 11 files listed.</a:t>
-            </a:r>
+            <a:endParaRPr lang="en-US" dirty="0"/>
           </a:p>
         </p:txBody>
       </p:sp>
@@ -955,7 +958,7 @@
     </p:spTree>
     <p:extLst>
       <p:ext uri="{BB962C8B-B14F-4D97-AF65-F5344CB8AC3E}">
-        <p14:creationId xmlns:p14="http://schemas.microsoft.com/office/powerpoint/2010/main" val="705332254"/>
+        <p14:creationId xmlns:p14="http://schemas.microsoft.com/office/powerpoint/2010/main" val="2807325679"/>
       </p:ext>
     </p:extLst>
   </p:cSld>
@@ -1011,16 +1014,7 @@
           <a:p>
             <a:r>
               <a:rPr lang="en-US" dirty="0"/>
-              <a:t>Our last example architecture is an event-driven architecture.  This is like a pipeline architecture, except that data may take one of many paths through the system.  Each processing unit has an in-box and one or more out-boxes, which are typically asynchronous message queues.</a:t>
-            </a:r>
-          </a:p>
-          <a:p>
-            <a:endParaRPr lang="en-US" dirty="0"/>
-          </a:p>
-          <a:p>
-            <a:r>
-              <a:rPr lang="en-US" dirty="0"/>
-              <a:t>Here, for example, is the workflow for a book-ordering system.</a:t>
+              <a:t>Many popular systems use this architecture.   Visual Studio Code uses this architecture to allow users to build popular extensions.   Emacs-lisp provides hook functions that can be overridden by the user. Git provides modifications by allowing the user to substitute their own file in place of the 11 files listed. </a:t>
             </a:r>
           </a:p>
         </p:txBody>
@@ -1043,6 +1037,205 @@
             <a:fld id="{07937F07-1250-4CCE-B198-1B2887014F41}" type="slidenum">
               <a:rPr lang="en-US" smtClean="0"/>
               <a:t>14</a:t>
+            </a:fld>
+            <a:endParaRPr lang="en-US"/>
+          </a:p>
+        </p:txBody>
+      </p:sp>
+    </p:spTree>
+    <p:extLst>
+      <p:ext uri="{BB962C8B-B14F-4D97-AF65-F5344CB8AC3E}">
+        <p14:creationId xmlns:p14="http://schemas.microsoft.com/office/powerpoint/2010/main" val="705332254"/>
+      </p:ext>
+    </p:extLst>
+  </p:cSld>
+  <p:clrMapOvr>
+    <a:masterClrMapping/>
+  </p:clrMapOvr>
+</p:notes>
+</file>
+
+<file path=ppt/notesSlides/notesSlide15.xml><?xml version="1.0" encoding="utf-8"?>
+<p:notes xmlns:a="http://schemas.openxmlformats.org/drawingml/2006/main" xmlns:r="http://schemas.openxmlformats.org/officeDocument/2006/relationships" xmlns:p="http://schemas.openxmlformats.org/presentationml/2006/main">
+  <p:cSld>
+    <p:spTree>
+      <p:nvGrpSpPr>
+        <p:cNvPr id="1" name=""/>
+        <p:cNvGrpSpPr/>
+        <p:nvPr/>
+      </p:nvGrpSpPr>
+      <p:grpSpPr>
+        <a:xfrm>
+          <a:off x="0" y="0"/>
+          <a:ext cx="0" cy="0"/>
+          <a:chOff x="0" y="0"/>
+          <a:chExt cx="0" cy="0"/>
+        </a:xfrm>
+      </p:grpSpPr>
+      <p:sp>
+        <p:nvSpPr>
+          <p:cNvPr id="2" name="Slide Image Placeholder 1"/>
+          <p:cNvSpPr>
+            <a:spLocks noGrp="1" noRot="1" noChangeAspect="1"/>
+          </p:cNvSpPr>
+          <p:nvPr>
+            <p:ph type="sldImg"/>
+          </p:nvPr>
+        </p:nvSpPr>
+        <p:spPr/>
+      </p:sp>
+      <p:sp>
+        <p:nvSpPr>
+          <p:cNvPr id="3" name="Notes Placeholder 2"/>
+          <p:cNvSpPr>
+            <a:spLocks noGrp="1"/>
+          </p:cNvSpPr>
+          <p:nvPr>
+            <p:ph type="body" idx="1"/>
+          </p:nvPr>
+        </p:nvSpPr>
+        <p:spPr/>
+        <p:txBody>
+          <a:bodyPr/>
+          <a:lstStyle/>
+          <a:p>
+            <a:r>
+              <a:rPr lang="en-US" dirty="0"/>
+              <a:t>Express.js, the </a:t>
+            </a:r>
+            <a:r>
+              <a:rPr lang="en-US" dirty="0" err="1"/>
+              <a:t>Javascript</a:t>
+            </a:r>
+            <a:r>
+              <a:rPr lang="en-US" dirty="0"/>
+              <a:t> web server that we will be using in this course, provides affordances in the form of methods that add actions to its built-in operations. Here we’ve constructed an empty server. This server (a thing in the real world!) is represented by an object (here called ‘app’).  This object provides public methods for changing the behavior of the server it represent.  Here the call ‘</a:t>
+            </a:r>
+            <a:r>
+              <a:rPr lang="en-US" dirty="0" err="1"/>
+              <a:t>app.get</a:t>
+            </a:r>
+            <a:r>
+              <a:rPr lang="en-US" dirty="0"/>
+              <a:t>’ allows us to specify the behavior of the empty server when it receives a request to the root URL ‘/’.</a:t>
+            </a:r>
+          </a:p>
+        </p:txBody>
+      </p:sp>
+      <p:sp>
+        <p:nvSpPr>
+          <p:cNvPr id="4" name="Slide Number Placeholder 3"/>
+          <p:cNvSpPr>
+            <a:spLocks noGrp="1"/>
+          </p:cNvSpPr>
+          <p:nvPr>
+            <p:ph type="sldNum" sz="quarter" idx="5"/>
+          </p:nvPr>
+        </p:nvSpPr>
+        <p:spPr/>
+        <p:txBody>
+          <a:bodyPr/>
+          <a:lstStyle/>
+          <a:p>
+            <a:fld id="{07937F07-1250-4CCE-B198-1B2887014F41}" type="slidenum">
+              <a:rPr lang="en-US" smtClean="0"/>
+              <a:t>15</a:t>
+            </a:fld>
+            <a:endParaRPr lang="en-US"/>
+          </a:p>
+        </p:txBody>
+      </p:sp>
+    </p:spTree>
+    <p:extLst>
+      <p:ext uri="{BB962C8B-B14F-4D97-AF65-F5344CB8AC3E}">
+        <p14:creationId xmlns:p14="http://schemas.microsoft.com/office/powerpoint/2010/main" val="3701214268"/>
+      </p:ext>
+    </p:extLst>
+  </p:cSld>
+  <p:clrMapOvr>
+    <a:masterClrMapping/>
+  </p:clrMapOvr>
+</p:notes>
+</file>
+
+<file path=ppt/notesSlides/notesSlide16.xml><?xml version="1.0" encoding="utf-8"?>
+<p:notes xmlns:a="http://schemas.openxmlformats.org/drawingml/2006/main" xmlns:r="http://schemas.openxmlformats.org/officeDocument/2006/relationships" xmlns:p="http://schemas.openxmlformats.org/presentationml/2006/main">
+  <p:cSld>
+    <p:spTree>
+      <p:nvGrpSpPr>
+        <p:cNvPr id="1" name=""/>
+        <p:cNvGrpSpPr/>
+        <p:nvPr/>
+      </p:nvGrpSpPr>
+      <p:grpSpPr>
+        <a:xfrm>
+          <a:off x="0" y="0"/>
+          <a:ext cx="0" cy="0"/>
+          <a:chOff x="0" y="0"/>
+          <a:chExt cx="0" cy="0"/>
+        </a:xfrm>
+      </p:grpSpPr>
+      <p:sp>
+        <p:nvSpPr>
+          <p:cNvPr id="2" name="Slide Image Placeholder 1"/>
+          <p:cNvSpPr>
+            <a:spLocks noGrp="1" noRot="1" noChangeAspect="1"/>
+          </p:cNvSpPr>
+          <p:nvPr>
+            <p:ph type="sldImg"/>
+          </p:nvPr>
+        </p:nvSpPr>
+        <p:spPr/>
+      </p:sp>
+      <p:sp>
+        <p:nvSpPr>
+          <p:cNvPr id="3" name="Notes Placeholder 2"/>
+          <p:cNvSpPr>
+            <a:spLocks noGrp="1"/>
+          </p:cNvSpPr>
+          <p:nvPr>
+            <p:ph type="body" idx="1"/>
+          </p:nvPr>
+        </p:nvSpPr>
+        <p:spPr/>
+        <p:txBody>
+          <a:bodyPr/>
+          <a:lstStyle/>
+          <a:p>
+            <a:r>
+              <a:rPr lang="en-US" dirty="0"/>
+              <a:t>Our last example architecture is an event-driven architecture.  This is like a pipeline architecture, except that data may take one of many paths through the system.  Each processing unit has an in-box and one or more out-boxes, which are typically asynchronous message queues.</a:t>
+            </a:r>
+          </a:p>
+          <a:p>
+            <a:endParaRPr lang="en-US" dirty="0"/>
+          </a:p>
+          <a:p>
+            <a:r>
+              <a:rPr lang="en-US" dirty="0"/>
+              <a:t>Here, for example, is the workflow for a book-ordering system.</a:t>
+            </a:r>
+          </a:p>
+        </p:txBody>
+      </p:sp>
+      <p:sp>
+        <p:nvSpPr>
+          <p:cNvPr id="4" name="Slide Number Placeholder 3"/>
+          <p:cNvSpPr>
+            <a:spLocks noGrp="1"/>
+          </p:cNvSpPr>
+          <p:nvPr>
+            <p:ph type="sldNum" sz="quarter" idx="5"/>
+          </p:nvPr>
+        </p:nvSpPr>
+        <p:spPr/>
+        <p:txBody>
+          <a:bodyPr/>
+          <a:lstStyle/>
+          <a:p>
+            <a:fld id="{07937F07-1250-4CCE-B198-1B2887014F41}" type="slidenum">
+              <a:rPr lang="en-US" smtClean="0"/>
+              <a:t>16</a:t>
             </a:fld>
             <a:endParaRPr lang="en-US"/>
           </a:p>
@@ -1371,7 +1564,7 @@
           <a:p>
             <a:r>
               <a:rPr lang="en-US" dirty="0"/>
-              <a:t>In this lesson, we will look briefly at 4 different architectural styles: &lt;read slide&gt;</a:t>
+              <a:t>In this lesson, we will look briefly at  different architectural styles: &lt;read slide&gt;</a:t>
             </a:r>
           </a:p>
         </p:txBody>
@@ -1950,7 +2143,7 @@
           <a:p>
             <a:fld id="{5D2A64DE-480B-420F-9649-4F8E696E08E0}" type="datetime1">
               <a:rPr lang="en-US" smtClean="0"/>
-              <a:t>1/12/2022</a:t>
+              <a:t>1/22/2022</a:t>
             </a:fld>
             <a:endParaRPr lang="en-US"/>
           </a:p>
@@ -2274,7 +2467,7 @@
           <a:p>
             <a:fld id="{EA476A42-A091-4468-A075-64A31BE59948}" type="datetime1">
               <a:rPr lang="en-US" smtClean="0"/>
-              <a:t>1/12/2022</a:t>
+              <a:t>1/22/2022</a:t>
             </a:fld>
             <a:endParaRPr lang="en-US"/>
           </a:p>
@@ -2472,7 +2665,7 @@
           <a:p>
             <a:fld id="{0D3616D0-8311-4107-9726-6B805E7D05BA}" type="datetime1">
               <a:rPr lang="en-US" smtClean="0"/>
-              <a:t>1/12/2022</a:t>
+              <a:t>1/22/2022</a:t>
             </a:fld>
             <a:endParaRPr lang="en-US"/>
           </a:p>
@@ -2680,7 +2873,7 @@
           <a:p>
             <a:fld id="{3BC2557A-5C88-417A-A763-5AC779462A5F}" type="datetime1">
               <a:rPr lang="en-US" smtClean="0"/>
-              <a:t>1/12/2022</a:t>
+              <a:t>1/22/2022</a:t>
             </a:fld>
             <a:endParaRPr lang="en-US"/>
           </a:p>
@@ -3204,7 +3397,7 @@
           <a:p>
             <a:fld id="{07C7BFD4-467E-4EDE-93EA-052F5B39A4E5}" type="datetime1">
               <a:rPr lang="en-US" smtClean="0"/>
-              <a:t>1/12/2022</a:t>
+              <a:t>1/22/2022</a:t>
             </a:fld>
             <a:endParaRPr lang="en-US"/>
           </a:p>
@@ -3454,7 +3647,7 @@
           <a:p>
             <a:fld id="{07C7BFD4-467E-4EDE-93EA-052F5B39A4E5}" type="datetime1">
               <a:rPr lang="en-US" smtClean="0"/>
-              <a:t>1/12/2022</a:t>
+              <a:t>1/22/2022</a:t>
             </a:fld>
             <a:endParaRPr lang="en-US"/>
           </a:p>
@@ -3636,7 +3829,7 @@
           <a:p>
             <a:fld id="{109E55A0-C911-4F03-82FC-7E5926047D46}" type="datetime1">
               <a:rPr lang="en-US" smtClean="0"/>
-              <a:t>1/12/2022</a:t>
+              <a:t>1/22/2022</a:t>
             </a:fld>
             <a:endParaRPr lang="en-US"/>
           </a:p>
@@ -3949,7 +4142,7 @@
           <a:p>
             <a:fld id="{A533CBE2-D5BE-47AC-ADC2-9CDFC1D0CF90}" type="datetime1">
               <a:rPr lang="en-US" smtClean="0"/>
-              <a:t>1/12/2022</a:t>
+              <a:t>1/22/2022</a:t>
             </a:fld>
             <a:endParaRPr lang="en-US"/>
           </a:p>
@@ -4250,7 +4443,7 @@
           <a:p>
             <a:fld id="{39B7EDB1-CE74-4951-85A2-0B01C2128E28}" type="datetime1">
               <a:rPr lang="en-US" smtClean="0"/>
-              <a:t>1/12/2022</a:t>
+              <a:t>1/22/2022</a:t>
             </a:fld>
             <a:endParaRPr lang="en-US"/>
           </a:p>
@@ -4698,7 +4891,7 @@
           <a:p>
             <a:fld id="{2BC7EB92-A5C2-4807-A9DC-9EDE6CBFB241}" type="datetime1">
               <a:rPr lang="en-US" smtClean="0"/>
-              <a:t>1/12/2022</a:t>
+              <a:t>1/22/2022</a:t>
             </a:fld>
             <a:endParaRPr lang="en-US"/>
           </a:p>
@@ -4811,7 +5004,7 @@
           <a:p>
             <a:fld id="{2B7B7EE0-7771-4CD5-9B2B-3550753A54A1}" type="datetime1">
               <a:rPr lang="en-US" smtClean="0"/>
-              <a:t>1/12/2022</a:t>
+              <a:t>1/22/2022</a:t>
             </a:fld>
             <a:endParaRPr lang="en-US"/>
           </a:p>
@@ -5122,7 +5315,7 @@
           <a:p>
             <a:fld id="{F8B318B3-0E87-4416-A9B8-D891968C2727}" type="datetime1">
               <a:rPr lang="en-US" smtClean="0"/>
-              <a:t>1/12/2022</a:t>
+              <a:t>1/22/2022</a:t>
             </a:fld>
             <a:endParaRPr lang="en-US"/>
           </a:p>
@@ -5363,7 +5556,7 @@
           <a:p>
             <a:fld id="{54D997E8-DDEE-43F1-8D9B-F8A1E11DE488}" type="datetime1">
               <a:rPr lang="en-US" smtClean="0"/>
-              <a:t>1/12/2022</a:t>
+              <a:t>1/22/2022</a:t>
             </a:fld>
             <a:endParaRPr lang="en-US"/>
           </a:p>
@@ -6471,7 +6664,7 @@
           <p:cNvPr id="2" name="Title 1">
             <a:extLst>
               <a:ext uri="{FF2B5EF4-FFF2-40B4-BE49-F238E27FC236}">
-                <a16:creationId xmlns:a16="http://schemas.microsoft.com/office/drawing/2014/main" id="{BC827D48-865A-456B-B5A2-4B71B7188377}"/>
+                <a16:creationId xmlns:a16="http://schemas.microsoft.com/office/drawing/2014/main" id="{69E06EB5-8F04-497E-B8E1-BAD48536BC2C}"/>
               </a:ext>
             </a:extLst>
           </p:cNvPr>
@@ -6488,18 +6681,19 @@
           <a:lstStyle/>
           <a:p>
             <a:r>
-              <a:rPr lang="en-US" dirty="0"/>
-              <a:t>Plugin Examples</a:t>
-            </a:r>
-          </a:p>
-        </p:txBody>
-      </p:sp>
-      <p:sp>
-        <p:nvSpPr>
-          <p:cNvPr id="3" name="Content Placeholder 2">
-            <a:extLst>
-              <a:ext uri="{FF2B5EF4-FFF2-40B4-BE49-F238E27FC236}">
-                <a16:creationId xmlns:a16="http://schemas.microsoft.com/office/drawing/2014/main" id="{32221941-0524-483D-BC8D-30E2A737946E}"/>
+              <a:rPr lang="en-US"/>
+              <a:t>Analogy: Affordances</a:t>
+            </a:r>
+            <a:endParaRPr lang="en-US" dirty="0"/>
+          </a:p>
+        </p:txBody>
+      </p:sp>
+      <p:sp>
+        <p:nvSpPr>
+          <p:cNvPr id="6" name="Content Placeholder 5">
+            <a:extLst>
+              <a:ext uri="{FF2B5EF4-FFF2-40B4-BE49-F238E27FC236}">
+                <a16:creationId xmlns:a16="http://schemas.microsoft.com/office/drawing/2014/main" id="{52F89A5F-6765-4316-8A54-4CCB9DFD7230}"/>
               </a:ext>
             </a:extLst>
           </p:cNvPr>
@@ -6512,43 +6706,57 @@
         </p:nvSpPr>
         <p:spPr>
           <a:xfrm>
-            <a:off x="838200" y="1500160"/>
-            <a:ext cx="8594188" cy="4351338"/>
+            <a:off x="838200" y="1674415"/>
+            <a:ext cx="5465064" cy="4351338"/>
           </a:xfrm>
         </p:spPr>
         <p:txBody>
-          <a:bodyPr/>
-          <a:lstStyle/>
-          <a:p>
-            <a:r>
-              <a:rPr lang="en-US" dirty="0"/>
-              <a:t>Many examples:</a:t>
+          <a:bodyPr>
+            <a:normAutofit fontScale="92500" lnSpcReduction="10000"/>
+          </a:bodyPr>
+          <a:lstStyle/>
+          <a:p>
+            <a:r>
+              <a:rPr lang="en-US" dirty="0"/>
+              <a:t>An “affordance” is a property of an object that enables some operation to be performed with/on that object</a:t>
             </a:r>
           </a:p>
           <a:p>
             <a:pPr lvl="1"/>
             <a:r>
-              <a:rPr lang="en-US" dirty="0"/>
-              <a:t>Visual Studio Code (internal org. + extension marketplace)</a:t>
+              <a:rPr lang="en-US" dirty="0" err="1"/>
+              <a:t>Eg</a:t>
+            </a:r>
+            <a:r>
+              <a:rPr lang="en-US" dirty="0"/>
+              <a:t>: zipper handles enable opening/closing</a:t>
             </a:r>
           </a:p>
           <a:p>
             <a:pPr lvl="1"/>
             <a:r>
               <a:rPr lang="en-US" dirty="0"/>
-              <a:t>emacs (emacs-lisp + hooks)</a:t>
+              <a:t>Door handles enable opening/closing</a:t>
             </a:r>
           </a:p>
           <a:p>
             <a:pPr lvl="1"/>
             <a:r>
               <a:rPr lang="en-US" dirty="0"/>
-              <a:t>git clients</a:t>
-            </a:r>
-          </a:p>
-          <a:p>
-            <a:pPr lvl="1"/>
-            <a:endParaRPr lang="en-US" dirty="0"/>
+              <a:t>Spouts enable pouring</a:t>
+            </a:r>
+          </a:p>
+          <a:p>
+            <a:r>
+              <a:rPr lang="en-US" dirty="0"/>
+              <a:t>In a microkernel architecture, the core contains affordances for extension</a:t>
+            </a:r>
+          </a:p>
+          <a:p>
+            <a:r>
+              <a:rPr lang="en-US" dirty="0"/>
+              <a:t>These affordances may have many possible forms</a:t>
+            </a:r>
           </a:p>
         </p:txBody>
       </p:sp>
@@ -6557,7 +6765,7 @@
           <p:cNvPr id="4" name="Slide Number Placeholder 3">
             <a:extLst>
               <a:ext uri="{FF2B5EF4-FFF2-40B4-BE49-F238E27FC236}">
-                <a16:creationId xmlns:a16="http://schemas.microsoft.com/office/drawing/2014/main" id="{2E2C4ADF-5976-4227-821B-C68F3EB6FAAF}"/>
+                <a16:creationId xmlns:a16="http://schemas.microsoft.com/office/drawing/2014/main" id="{5D2EDE44-7B18-47DA-B7DF-74618AA294E5}"/>
               </a:ext>
             </a:extLst>
           </p:cNvPr>
@@ -6575,274 +6783,63 @@
           <a:p>
             <a:fld id="{20F37917-FD3A-4669-9018-DA04BCDD3D75}" type="slidenum">
               <a:rPr lang="en-US" smtClean="0"/>
-              <a:pPr/>
               <a:t>13</a:t>
             </a:fld>
             <a:endParaRPr lang="en-US"/>
           </a:p>
         </p:txBody>
       </p:sp>
-      <p:sp>
-        <p:nvSpPr>
-          <p:cNvPr id="8" name="Rectangle 7">
-            <a:extLst>
-              <a:ext uri="{FF2B5EF4-FFF2-40B4-BE49-F238E27FC236}">
-                <a16:creationId xmlns:a16="http://schemas.microsoft.com/office/drawing/2014/main" id="{206C54B8-FC37-476B-9824-6C02CEDE32E4}"/>
-              </a:ext>
-            </a:extLst>
-          </p:cNvPr>
-          <p:cNvSpPr/>
+      <p:pic>
+        <p:nvPicPr>
+          <p:cNvPr id="7" name="Picture 6">
+            <a:extLst>
+              <a:ext uri="{FF2B5EF4-FFF2-40B4-BE49-F238E27FC236}">
+                <a16:creationId xmlns:a16="http://schemas.microsoft.com/office/drawing/2014/main" id="{4E894CCC-33A1-471B-BFB3-43B36DA13EE9}"/>
+              </a:ext>
+            </a:extLst>
+          </p:cNvPr>
+          <p:cNvPicPr>
+            <a:picLocks noChangeAspect="1" noChangeArrowheads="1"/>
+          </p:cNvPicPr>
           <p:nvPr/>
-        </p:nvSpPr>
-        <p:spPr>
+        </p:nvPicPr>
+        <p:blipFill>
+          <a:blip r:embed="rId3">
+            <a:extLst>
+              <a:ext uri="{28A0092B-C50C-407E-A947-70E740481C1C}">
+                <a14:useLocalDpi xmlns:a14="http://schemas.microsoft.com/office/drawing/2010/main" val="0"/>
+              </a:ext>
+            </a:extLst>
+          </a:blip>
+          <a:srcRect/>
+          <a:stretch>
+            <a:fillRect/>
+          </a:stretch>
+        </p:blipFill>
+        <p:spPr bwMode="auto">
           <a:xfrm>
-            <a:off x="635000" y="3675829"/>
-            <a:ext cx="11231419" cy="1477328"/>
+            <a:off x="6924501" y="1781157"/>
+            <a:ext cx="4394247" cy="3295685"/>
           </a:xfrm>
           <a:prstGeom prst="rect">
             <a:avLst/>
           </a:prstGeom>
-          <a:solidFill>
-            <a:schemeClr val="accent6">
-              <a:lumMod val="20000"/>
-              <a:lumOff val="80000"/>
-            </a:schemeClr>
-          </a:solidFill>
+          <a:noFill/>
+          <a:extLst>
+            <a:ext uri="{909E8E84-426E-40DD-AFC4-6F175D3DCCD1}">
+              <a14:hiddenFill xmlns:a14="http://schemas.microsoft.com/office/drawing/2010/main">
+                <a:solidFill>
+                  <a:srgbClr val="FFFFFF"/>
+                </a:solidFill>
+              </a14:hiddenFill>
+            </a:ext>
+          </a:extLst>
         </p:spPr>
-        <p:txBody>
-          <a:bodyPr wrap="square">
-            <a:spAutoFit/>
-          </a:bodyPr>
-          <a:lstStyle/>
-          <a:p>
-            <a:r>
-              <a:rPr lang="en-US" dirty="0">
-                <a:solidFill>
-                  <a:prstClr val="black"/>
-                </a:solidFill>
-                <a:latin typeface="Lucida Console" panose="020B0609040504020204" pitchFamily="49" charset="0"/>
-              </a:rPr>
-              <a:t>$ ls .git/hooks</a:t>
-            </a:r>
-          </a:p>
-          <a:p>
-            <a:r>
-              <a:rPr lang="en-US" dirty="0" err="1">
-                <a:solidFill>
-                  <a:prstClr val="black"/>
-                </a:solidFill>
-                <a:latin typeface="Lucida Console" panose="020B0609040504020204" pitchFamily="49" charset="0"/>
-              </a:rPr>
-              <a:t>applypatch-msg.sample</a:t>
-            </a:r>
-            <a:r>
-              <a:rPr lang="en-US" dirty="0">
-                <a:solidFill>
-                  <a:prstClr val="black"/>
-                </a:solidFill>
-                <a:latin typeface="Lucida Console" panose="020B0609040504020204" pitchFamily="49" charset="0"/>
-              </a:rPr>
-              <a:t>      pre-</a:t>
-            </a:r>
-            <a:r>
-              <a:rPr lang="en-US" dirty="0" err="1">
-                <a:solidFill>
-                  <a:prstClr val="black"/>
-                </a:solidFill>
-                <a:latin typeface="Lucida Console" panose="020B0609040504020204" pitchFamily="49" charset="0"/>
-              </a:rPr>
-              <a:t>applypatch.sample</a:t>
-            </a:r>
-            <a:r>
-              <a:rPr lang="en-US" dirty="0">
-                <a:solidFill>
-                  <a:prstClr val="black"/>
-                </a:solidFill>
-                <a:latin typeface="Lucida Console" panose="020B0609040504020204" pitchFamily="49" charset="0"/>
-              </a:rPr>
-              <a:t>      pre-</a:t>
-            </a:r>
-            <a:r>
-              <a:rPr lang="en-US" dirty="0" err="1">
-                <a:solidFill>
-                  <a:prstClr val="black"/>
-                </a:solidFill>
-                <a:latin typeface="Lucida Console" panose="020B0609040504020204" pitchFamily="49" charset="0"/>
-              </a:rPr>
-              <a:t>rebase.sample</a:t>
-            </a:r>
-            <a:endParaRPr lang="en-US" dirty="0">
-              <a:solidFill>
-                <a:prstClr val="black"/>
-              </a:solidFill>
-              <a:latin typeface="Lucida Console" panose="020B0609040504020204" pitchFamily="49" charset="0"/>
-            </a:endParaRPr>
-          </a:p>
-          <a:p>
-            <a:r>
-              <a:rPr lang="en-US" dirty="0">
-                <a:solidFill>
-                  <a:prstClr val="black"/>
-                </a:solidFill>
-                <a:latin typeface="Lucida Console" panose="020B0609040504020204" pitchFamily="49" charset="0"/>
-              </a:rPr>
-              <a:t>commit-</a:t>
-            </a:r>
-            <a:r>
-              <a:rPr lang="en-US" dirty="0" err="1">
-                <a:solidFill>
-                  <a:prstClr val="black"/>
-                </a:solidFill>
-                <a:latin typeface="Lucida Console" panose="020B0609040504020204" pitchFamily="49" charset="0"/>
-              </a:rPr>
-              <a:t>msg.sample</a:t>
-            </a:r>
-            <a:r>
-              <a:rPr lang="en-US" dirty="0">
-                <a:solidFill>
-                  <a:prstClr val="black"/>
-                </a:solidFill>
-                <a:latin typeface="Lucida Console" panose="020B0609040504020204" pitchFamily="49" charset="0"/>
-              </a:rPr>
-              <a:t>          pre-</a:t>
-            </a:r>
-            <a:r>
-              <a:rPr lang="en-US" dirty="0" err="1">
-                <a:solidFill>
-                  <a:prstClr val="black"/>
-                </a:solidFill>
-                <a:latin typeface="Lucida Console" panose="020B0609040504020204" pitchFamily="49" charset="0"/>
-              </a:rPr>
-              <a:t>commit.sample</a:t>
-            </a:r>
-            <a:r>
-              <a:rPr lang="en-US" dirty="0">
-                <a:solidFill>
-                  <a:prstClr val="black"/>
-                </a:solidFill>
-                <a:latin typeface="Lucida Console" panose="020B0609040504020204" pitchFamily="49" charset="0"/>
-              </a:rPr>
-              <a:t>          pre-</a:t>
-            </a:r>
-            <a:r>
-              <a:rPr lang="en-US" dirty="0" err="1">
-                <a:solidFill>
-                  <a:prstClr val="black"/>
-                </a:solidFill>
-                <a:latin typeface="Lucida Console" panose="020B0609040504020204" pitchFamily="49" charset="0"/>
-              </a:rPr>
-              <a:t>receive.sample</a:t>
-            </a:r>
-            <a:endParaRPr lang="en-US" dirty="0">
-              <a:solidFill>
-                <a:prstClr val="black"/>
-              </a:solidFill>
-              <a:latin typeface="Lucida Console" panose="020B0609040504020204" pitchFamily="49" charset="0"/>
-            </a:endParaRPr>
-          </a:p>
-          <a:p>
-            <a:r>
-              <a:rPr lang="en-US" dirty="0" err="1">
-                <a:solidFill>
-                  <a:prstClr val="black"/>
-                </a:solidFill>
-                <a:latin typeface="Lucida Console" panose="020B0609040504020204" pitchFamily="49" charset="0"/>
-              </a:rPr>
-              <a:t>fsmonitor-watchman.sample</a:t>
-            </a:r>
-            <a:r>
-              <a:rPr lang="en-US" dirty="0">
-                <a:solidFill>
-                  <a:prstClr val="black"/>
-                </a:solidFill>
-                <a:latin typeface="Lucida Console" panose="020B0609040504020204" pitchFamily="49" charset="0"/>
-              </a:rPr>
-              <a:t>  prepare-commit-</a:t>
-            </a:r>
-            <a:r>
-              <a:rPr lang="en-US" dirty="0" err="1">
-                <a:solidFill>
-                  <a:prstClr val="black"/>
-                </a:solidFill>
-                <a:latin typeface="Lucida Console" panose="020B0609040504020204" pitchFamily="49" charset="0"/>
-              </a:rPr>
-              <a:t>msg.sample</a:t>
-            </a:r>
-            <a:r>
-              <a:rPr lang="en-US" dirty="0">
-                <a:solidFill>
-                  <a:prstClr val="black"/>
-                </a:solidFill>
-                <a:latin typeface="Lucida Console" panose="020B0609040504020204" pitchFamily="49" charset="0"/>
-              </a:rPr>
-              <a:t>  </a:t>
-            </a:r>
-            <a:r>
-              <a:rPr lang="en-US" dirty="0" err="1">
-                <a:solidFill>
-                  <a:prstClr val="black"/>
-                </a:solidFill>
-                <a:latin typeface="Lucida Console" panose="020B0609040504020204" pitchFamily="49" charset="0"/>
-              </a:rPr>
-              <a:t>update.sample</a:t>
-            </a:r>
-            <a:endParaRPr lang="en-US" dirty="0">
-              <a:solidFill>
-                <a:prstClr val="black"/>
-              </a:solidFill>
-              <a:latin typeface="Lucida Console" panose="020B0609040504020204" pitchFamily="49" charset="0"/>
-            </a:endParaRPr>
-          </a:p>
-          <a:p>
-            <a:r>
-              <a:rPr lang="en-US" dirty="0">
-                <a:solidFill>
-                  <a:prstClr val="black"/>
-                </a:solidFill>
-                <a:latin typeface="Lucida Console" panose="020B0609040504020204" pitchFamily="49" charset="0"/>
-              </a:rPr>
-              <a:t>post-</a:t>
-            </a:r>
-            <a:r>
-              <a:rPr lang="en-US" dirty="0" err="1">
-                <a:solidFill>
-                  <a:prstClr val="black"/>
-                </a:solidFill>
-                <a:latin typeface="Lucida Console" panose="020B0609040504020204" pitchFamily="49" charset="0"/>
-              </a:rPr>
-              <a:t>update.sample</a:t>
-            </a:r>
-            <a:r>
-              <a:rPr lang="en-US" dirty="0">
-                <a:solidFill>
-                  <a:prstClr val="black"/>
-                </a:solidFill>
-                <a:latin typeface="Lucida Console" panose="020B0609040504020204" pitchFamily="49" charset="0"/>
-              </a:rPr>
-              <a:t>         pre-</a:t>
-            </a:r>
-            <a:r>
-              <a:rPr lang="en-US" dirty="0" err="1">
-                <a:solidFill>
-                  <a:prstClr val="black"/>
-                </a:solidFill>
-                <a:latin typeface="Lucida Console" panose="020B0609040504020204" pitchFamily="49" charset="0"/>
-              </a:rPr>
-              <a:t>push.sample</a:t>
-            </a:r>
-            <a:endParaRPr lang="en-US" dirty="0">
-              <a:solidFill>
-                <a:prstClr val="black"/>
-              </a:solidFill>
-              <a:latin typeface="Lucida Console" panose="020B0609040504020204" pitchFamily="49" charset="0"/>
-            </a:endParaRPr>
-          </a:p>
-        </p:txBody>
-      </p:sp>
+      </p:pic>
     </p:spTree>
     <p:extLst>
       <p:ext uri="{BB962C8B-B14F-4D97-AF65-F5344CB8AC3E}">
-        <p14:creationId xmlns:p14="http://schemas.microsoft.com/office/powerpoint/2010/main" val="125374142"/>
+        <p14:creationId xmlns:p14="http://schemas.microsoft.com/office/powerpoint/2010/main" val="414894705"/>
       </p:ext>
     </p:extLst>
   </p:cSld>
@@ -6874,6 +6871,575 @@
           <p:cNvPr id="2" name="Title 1">
             <a:extLst>
               <a:ext uri="{FF2B5EF4-FFF2-40B4-BE49-F238E27FC236}">
+                <a16:creationId xmlns:a16="http://schemas.microsoft.com/office/drawing/2014/main" id="{BC827D48-865A-456B-B5A2-4B71B7188377}"/>
+              </a:ext>
+            </a:extLst>
+          </p:cNvPr>
+          <p:cNvSpPr>
+            <a:spLocks noGrp="1"/>
+          </p:cNvSpPr>
+          <p:nvPr>
+            <p:ph type="title"/>
+          </p:nvPr>
+        </p:nvSpPr>
+        <p:spPr/>
+        <p:txBody>
+          <a:bodyPr/>
+          <a:lstStyle/>
+          <a:p>
+            <a:r>
+              <a:rPr lang="en-US" dirty="0"/>
+              <a:t>Plugin Examples</a:t>
+            </a:r>
+          </a:p>
+        </p:txBody>
+      </p:sp>
+      <p:sp>
+        <p:nvSpPr>
+          <p:cNvPr id="3" name="Content Placeholder 2">
+            <a:extLst>
+              <a:ext uri="{FF2B5EF4-FFF2-40B4-BE49-F238E27FC236}">
+                <a16:creationId xmlns:a16="http://schemas.microsoft.com/office/drawing/2014/main" id="{32221941-0524-483D-BC8D-30E2A737946E}"/>
+              </a:ext>
+            </a:extLst>
+          </p:cNvPr>
+          <p:cNvSpPr>
+            <a:spLocks noGrp="1"/>
+          </p:cNvSpPr>
+          <p:nvPr>
+            <p:ph idx="1"/>
+          </p:nvPr>
+        </p:nvSpPr>
+        <p:spPr>
+          <a:xfrm>
+            <a:off x="838200" y="1500160"/>
+            <a:ext cx="8594188" cy="4351338"/>
+          </a:xfrm>
+        </p:spPr>
+        <p:txBody>
+          <a:bodyPr/>
+          <a:lstStyle/>
+          <a:p>
+            <a:r>
+              <a:rPr lang="en-US" dirty="0"/>
+              <a:t>Many examples:</a:t>
+            </a:r>
+          </a:p>
+          <a:p>
+            <a:pPr lvl="1"/>
+            <a:r>
+              <a:rPr lang="en-US" dirty="0"/>
+              <a:t>Visual Studio Code (internal org. + extension marketplace)</a:t>
+            </a:r>
+          </a:p>
+          <a:p>
+            <a:pPr lvl="1"/>
+            <a:r>
+              <a:rPr lang="en-US" dirty="0"/>
+              <a:t>emacs (emacs-lisp + hooks)</a:t>
+            </a:r>
+          </a:p>
+          <a:p>
+            <a:pPr lvl="1"/>
+            <a:r>
+              <a:rPr lang="en-US" dirty="0"/>
+              <a:t>git clients</a:t>
+            </a:r>
+          </a:p>
+          <a:p>
+            <a:pPr lvl="1"/>
+            <a:endParaRPr lang="en-US" dirty="0"/>
+          </a:p>
+        </p:txBody>
+      </p:sp>
+      <p:sp>
+        <p:nvSpPr>
+          <p:cNvPr id="4" name="Slide Number Placeholder 3">
+            <a:extLst>
+              <a:ext uri="{FF2B5EF4-FFF2-40B4-BE49-F238E27FC236}">
+                <a16:creationId xmlns:a16="http://schemas.microsoft.com/office/drawing/2014/main" id="{2E2C4ADF-5976-4227-821B-C68F3EB6FAAF}"/>
+              </a:ext>
+            </a:extLst>
+          </p:cNvPr>
+          <p:cNvSpPr>
+            <a:spLocks noGrp="1"/>
+          </p:cNvSpPr>
+          <p:nvPr>
+            <p:ph type="sldNum" sz="quarter" idx="12"/>
+          </p:nvPr>
+        </p:nvSpPr>
+        <p:spPr/>
+        <p:txBody>
+          <a:bodyPr/>
+          <a:lstStyle/>
+          <a:p>
+            <a:fld id="{20F37917-FD3A-4669-9018-DA04BCDD3D75}" type="slidenum">
+              <a:rPr lang="en-US" smtClean="0"/>
+              <a:pPr/>
+              <a:t>14</a:t>
+            </a:fld>
+            <a:endParaRPr lang="en-US"/>
+          </a:p>
+        </p:txBody>
+      </p:sp>
+      <p:sp>
+        <p:nvSpPr>
+          <p:cNvPr id="8" name="Rectangle 7">
+            <a:extLst>
+              <a:ext uri="{FF2B5EF4-FFF2-40B4-BE49-F238E27FC236}">
+                <a16:creationId xmlns:a16="http://schemas.microsoft.com/office/drawing/2014/main" id="{206C54B8-FC37-476B-9824-6C02CEDE32E4}"/>
+              </a:ext>
+            </a:extLst>
+          </p:cNvPr>
+          <p:cNvSpPr/>
+          <p:nvPr/>
+        </p:nvSpPr>
+        <p:spPr>
+          <a:xfrm>
+            <a:off x="635000" y="3675829"/>
+            <a:ext cx="11231419" cy="1477328"/>
+          </a:xfrm>
+          <a:prstGeom prst="rect">
+            <a:avLst/>
+          </a:prstGeom>
+          <a:solidFill>
+            <a:schemeClr val="accent6">
+              <a:lumMod val="20000"/>
+              <a:lumOff val="80000"/>
+            </a:schemeClr>
+          </a:solidFill>
+        </p:spPr>
+        <p:txBody>
+          <a:bodyPr wrap="square">
+            <a:spAutoFit/>
+          </a:bodyPr>
+          <a:lstStyle/>
+          <a:p>
+            <a:r>
+              <a:rPr lang="en-US" dirty="0">
+                <a:solidFill>
+                  <a:prstClr val="black"/>
+                </a:solidFill>
+                <a:latin typeface="Lucida Console" panose="020B0609040504020204" pitchFamily="49" charset="0"/>
+              </a:rPr>
+              <a:t>$ ls .git/hooks</a:t>
+            </a:r>
+          </a:p>
+          <a:p>
+            <a:r>
+              <a:rPr lang="en-US" dirty="0" err="1">
+                <a:solidFill>
+                  <a:prstClr val="black"/>
+                </a:solidFill>
+                <a:latin typeface="Lucida Console" panose="020B0609040504020204" pitchFamily="49" charset="0"/>
+              </a:rPr>
+              <a:t>applypatch-msg.sample</a:t>
+            </a:r>
+            <a:r>
+              <a:rPr lang="en-US" dirty="0">
+                <a:solidFill>
+                  <a:prstClr val="black"/>
+                </a:solidFill>
+                <a:latin typeface="Lucida Console" panose="020B0609040504020204" pitchFamily="49" charset="0"/>
+              </a:rPr>
+              <a:t>      pre-</a:t>
+            </a:r>
+            <a:r>
+              <a:rPr lang="en-US" dirty="0" err="1">
+                <a:solidFill>
+                  <a:prstClr val="black"/>
+                </a:solidFill>
+                <a:latin typeface="Lucida Console" panose="020B0609040504020204" pitchFamily="49" charset="0"/>
+              </a:rPr>
+              <a:t>applypatch.sample</a:t>
+            </a:r>
+            <a:r>
+              <a:rPr lang="en-US" dirty="0">
+                <a:solidFill>
+                  <a:prstClr val="black"/>
+                </a:solidFill>
+                <a:latin typeface="Lucida Console" panose="020B0609040504020204" pitchFamily="49" charset="0"/>
+              </a:rPr>
+              <a:t>      pre-</a:t>
+            </a:r>
+            <a:r>
+              <a:rPr lang="en-US" dirty="0" err="1">
+                <a:solidFill>
+                  <a:prstClr val="black"/>
+                </a:solidFill>
+                <a:latin typeface="Lucida Console" panose="020B0609040504020204" pitchFamily="49" charset="0"/>
+              </a:rPr>
+              <a:t>rebase.sample</a:t>
+            </a:r>
+            <a:endParaRPr lang="en-US" dirty="0">
+              <a:solidFill>
+                <a:prstClr val="black"/>
+              </a:solidFill>
+              <a:latin typeface="Lucida Console" panose="020B0609040504020204" pitchFamily="49" charset="0"/>
+            </a:endParaRPr>
+          </a:p>
+          <a:p>
+            <a:r>
+              <a:rPr lang="en-US" dirty="0">
+                <a:solidFill>
+                  <a:prstClr val="black"/>
+                </a:solidFill>
+                <a:latin typeface="Lucida Console" panose="020B0609040504020204" pitchFamily="49" charset="0"/>
+              </a:rPr>
+              <a:t>commit-</a:t>
+            </a:r>
+            <a:r>
+              <a:rPr lang="en-US" dirty="0" err="1">
+                <a:solidFill>
+                  <a:prstClr val="black"/>
+                </a:solidFill>
+                <a:latin typeface="Lucida Console" panose="020B0609040504020204" pitchFamily="49" charset="0"/>
+              </a:rPr>
+              <a:t>msg.sample</a:t>
+            </a:r>
+            <a:r>
+              <a:rPr lang="en-US" dirty="0">
+                <a:solidFill>
+                  <a:prstClr val="black"/>
+                </a:solidFill>
+                <a:latin typeface="Lucida Console" panose="020B0609040504020204" pitchFamily="49" charset="0"/>
+              </a:rPr>
+              <a:t>          pre-</a:t>
+            </a:r>
+            <a:r>
+              <a:rPr lang="en-US" dirty="0" err="1">
+                <a:solidFill>
+                  <a:prstClr val="black"/>
+                </a:solidFill>
+                <a:latin typeface="Lucida Console" panose="020B0609040504020204" pitchFamily="49" charset="0"/>
+              </a:rPr>
+              <a:t>commit.sample</a:t>
+            </a:r>
+            <a:r>
+              <a:rPr lang="en-US" dirty="0">
+                <a:solidFill>
+                  <a:prstClr val="black"/>
+                </a:solidFill>
+                <a:latin typeface="Lucida Console" panose="020B0609040504020204" pitchFamily="49" charset="0"/>
+              </a:rPr>
+              <a:t>          pre-</a:t>
+            </a:r>
+            <a:r>
+              <a:rPr lang="en-US" dirty="0" err="1">
+                <a:solidFill>
+                  <a:prstClr val="black"/>
+                </a:solidFill>
+                <a:latin typeface="Lucida Console" panose="020B0609040504020204" pitchFamily="49" charset="0"/>
+              </a:rPr>
+              <a:t>receive.sample</a:t>
+            </a:r>
+            <a:endParaRPr lang="en-US" dirty="0">
+              <a:solidFill>
+                <a:prstClr val="black"/>
+              </a:solidFill>
+              <a:latin typeface="Lucida Console" panose="020B0609040504020204" pitchFamily="49" charset="0"/>
+            </a:endParaRPr>
+          </a:p>
+          <a:p>
+            <a:r>
+              <a:rPr lang="en-US" dirty="0" err="1">
+                <a:solidFill>
+                  <a:prstClr val="black"/>
+                </a:solidFill>
+                <a:latin typeface="Lucida Console" panose="020B0609040504020204" pitchFamily="49" charset="0"/>
+              </a:rPr>
+              <a:t>fsmonitor-watchman.sample</a:t>
+            </a:r>
+            <a:r>
+              <a:rPr lang="en-US" dirty="0">
+                <a:solidFill>
+                  <a:prstClr val="black"/>
+                </a:solidFill>
+                <a:latin typeface="Lucida Console" panose="020B0609040504020204" pitchFamily="49" charset="0"/>
+              </a:rPr>
+              <a:t>  prepare-commit-</a:t>
+            </a:r>
+            <a:r>
+              <a:rPr lang="en-US" dirty="0" err="1">
+                <a:solidFill>
+                  <a:prstClr val="black"/>
+                </a:solidFill>
+                <a:latin typeface="Lucida Console" panose="020B0609040504020204" pitchFamily="49" charset="0"/>
+              </a:rPr>
+              <a:t>msg.sample</a:t>
+            </a:r>
+            <a:r>
+              <a:rPr lang="en-US" dirty="0">
+                <a:solidFill>
+                  <a:prstClr val="black"/>
+                </a:solidFill>
+                <a:latin typeface="Lucida Console" panose="020B0609040504020204" pitchFamily="49" charset="0"/>
+              </a:rPr>
+              <a:t>  </a:t>
+            </a:r>
+            <a:r>
+              <a:rPr lang="en-US" dirty="0" err="1">
+                <a:solidFill>
+                  <a:prstClr val="black"/>
+                </a:solidFill>
+                <a:latin typeface="Lucida Console" panose="020B0609040504020204" pitchFamily="49" charset="0"/>
+              </a:rPr>
+              <a:t>update.sample</a:t>
+            </a:r>
+            <a:endParaRPr lang="en-US" dirty="0">
+              <a:solidFill>
+                <a:prstClr val="black"/>
+              </a:solidFill>
+              <a:latin typeface="Lucida Console" panose="020B0609040504020204" pitchFamily="49" charset="0"/>
+            </a:endParaRPr>
+          </a:p>
+          <a:p>
+            <a:r>
+              <a:rPr lang="en-US" dirty="0">
+                <a:solidFill>
+                  <a:prstClr val="black"/>
+                </a:solidFill>
+                <a:latin typeface="Lucida Console" panose="020B0609040504020204" pitchFamily="49" charset="0"/>
+              </a:rPr>
+              <a:t>post-</a:t>
+            </a:r>
+            <a:r>
+              <a:rPr lang="en-US" dirty="0" err="1">
+                <a:solidFill>
+                  <a:prstClr val="black"/>
+                </a:solidFill>
+                <a:latin typeface="Lucida Console" panose="020B0609040504020204" pitchFamily="49" charset="0"/>
+              </a:rPr>
+              <a:t>update.sample</a:t>
+            </a:r>
+            <a:r>
+              <a:rPr lang="en-US" dirty="0">
+                <a:solidFill>
+                  <a:prstClr val="black"/>
+                </a:solidFill>
+                <a:latin typeface="Lucida Console" panose="020B0609040504020204" pitchFamily="49" charset="0"/>
+              </a:rPr>
+              <a:t>         pre-</a:t>
+            </a:r>
+            <a:r>
+              <a:rPr lang="en-US" dirty="0" err="1">
+                <a:solidFill>
+                  <a:prstClr val="black"/>
+                </a:solidFill>
+                <a:latin typeface="Lucida Console" panose="020B0609040504020204" pitchFamily="49" charset="0"/>
+              </a:rPr>
+              <a:t>push.sample</a:t>
+            </a:r>
+            <a:endParaRPr lang="en-US" dirty="0">
+              <a:solidFill>
+                <a:prstClr val="black"/>
+              </a:solidFill>
+              <a:latin typeface="Lucida Console" panose="020B0609040504020204" pitchFamily="49" charset="0"/>
+            </a:endParaRPr>
+          </a:p>
+        </p:txBody>
+      </p:sp>
+    </p:spTree>
+    <p:extLst>
+      <p:ext uri="{BB962C8B-B14F-4D97-AF65-F5344CB8AC3E}">
+        <p14:creationId xmlns:p14="http://schemas.microsoft.com/office/powerpoint/2010/main" val="125374142"/>
+      </p:ext>
+    </p:extLst>
+  </p:cSld>
+  <p:clrMapOvr>
+    <a:masterClrMapping/>
+  </p:clrMapOvr>
+</p:sld>
+</file>
+
+<file path=ppt/slides/slide15.xml><?xml version="1.0" encoding="utf-8"?>
+<p:sld xmlns:a="http://schemas.openxmlformats.org/drawingml/2006/main" xmlns:r="http://schemas.openxmlformats.org/officeDocument/2006/relationships" xmlns:p="http://schemas.openxmlformats.org/presentationml/2006/main">
+  <p:cSld>
+    <p:spTree>
+      <p:nvGrpSpPr>
+        <p:cNvPr id="1" name=""/>
+        <p:cNvGrpSpPr/>
+        <p:nvPr/>
+      </p:nvGrpSpPr>
+      <p:grpSpPr>
+        <a:xfrm>
+          <a:off x="0" y="0"/>
+          <a:ext cx="0" cy="0"/>
+          <a:chOff x="0" y="0"/>
+          <a:chExt cx="0" cy="0"/>
+        </a:xfrm>
+      </p:grpSpPr>
+      <p:sp>
+        <p:nvSpPr>
+          <p:cNvPr id="2" name="Title 1">
+            <a:extLst>
+              <a:ext uri="{FF2B5EF4-FFF2-40B4-BE49-F238E27FC236}">
+                <a16:creationId xmlns:a16="http://schemas.microsoft.com/office/drawing/2014/main" id="{5EBC2683-A193-45A3-BBE2-70BAF53A2F1D}"/>
+              </a:ext>
+            </a:extLst>
+          </p:cNvPr>
+          <p:cNvSpPr>
+            <a:spLocks noGrp="1"/>
+          </p:cNvSpPr>
+          <p:nvPr>
+            <p:ph type="title"/>
+          </p:nvPr>
+        </p:nvSpPr>
+        <p:spPr/>
+        <p:txBody>
+          <a:bodyPr/>
+          <a:lstStyle/>
+          <a:p>
+            <a:r>
+              <a:rPr lang="en-US" dirty="0"/>
+              <a:t>Express.js provides methods for modifying its built-in actions</a:t>
+            </a:r>
+          </a:p>
+        </p:txBody>
+      </p:sp>
+      <p:sp>
+        <p:nvSpPr>
+          <p:cNvPr id="4" name="Slide Number Placeholder 3">
+            <a:extLst>
+              <a:ext uri="{FF2B5EF4-FFF2-40B4-BE49-F238E27FC236}">
+                <a16:creationId xmlns:a16="http://schemas.microsoft.com/office/drawing/2014/main" id="{5B352B46-A32B-42D7-8741-07DD17C34085}"/>
+              </a:ext>
+            </a:extLst>
+          </p:cNvPr>
+          <p:cNvSpPr>
+            <a:spLocks noGrp="1"/>
+          </p:cNvSpPr>
+          <p:nvPr>
+            <p:ph type="sldNum" sz="quarter" idx="12"/>
+          </p:nvPr>
+        </p:nvSpPr>
+        <p:spPr/>
+        <p:txBody>
+          <a:bodyPr/>
+          <a:lstStyle/>
+          <a:p>
+            <a:fld id="{20F37917-FD3A-4669-9018-DA04BCDD3D75}" type="slidenum">
+              <a:rPr lang="en-US" smtClean="0"/>
+              <a:t>15</a:t>
+            </a:fld>
+            <a:endParaRPr lang="en-US" dirty="0"/>
+          </a:p>
+        </p:txBody>
+      </p:sp>
+      <p:pic>
+        <p:nvPicPr>
+          <p:cNvPr id="6" name="Picture 5">
+            <a:extLst>
+              <a:ext uri="{FF2B5EF4-FFF2-40B4-BE49-F238E27FC236}">
+                <a16:creationId xmlns:a16="http://schemas.microsoft.com/office/drawing/2014/main" id="{48DED0DB-F811-49AD-B684-4FE4AD35A7EA}"/>
+              </a:ext>
+            </a:extLst>
+          </p:cNvPr>
+          <p:cNvPicPr>
+            <a:picLocks noChangeAspect="1"/>
+          </p:cNvPicPr>
+          <p:nvPr/>
+        </p:nvPicPr>
+        <p:blipFill>
+          <a:blip r:embed="rId3"/>
+          <a:stretch>
+            <a:fillRect/>
+          </a:stretch>
+        </p:blipFill>
+        <p:spPr>
+          <a:xfrm>
+            <a:off x="2490787" y="1552575"/>
+            <a:ext cx="7210425" cy="3752850"/>
+          </a:xfrm>
+          <a:prstGeom prst="rect">
+            <a:avLst/>
+          </a:prstGeom>
+        </p:spPr>
+      </p:pic>
+      <p:sp>
+        <p:nvSpPr>
+          <p:cNvPr id="8" name="TextBox 7">
+            <a:extLst>
+              <a:ext uri="{FF2B5EF4-FFF2-40B4-BE49-F238E27FC236}">
+                <a16:creationId xmlns:a16="http://schemas.microsoft.com/office/drawing/2014/main" id="{C1E98868-021A-4A0E-AE78-1138ECB0C58C}"/>
+              </a:ext>
+            </a:extLst>
+          </p:cNvPr>
+          <p:cNvSpPr txBox="1"/>
+          <p:nvPr/>
+        </p:nvSpPr>
+        <p:spPr>
+          <a:xfrm>
+            <a:off x="4713732" y="5795510"/>
+            <a:ext cx="6099048" cy="369332"/>
+          </a:xfrm>
+          <a:prstGeom prst="rect">
+            <a:avLst/>
+          </a:prstGeom>
+          <a:ln/>
+        </p:spPr>
+        <p:style>
+          <a:lnRef idx="2">
+            <a:schemeClr val="dk1"/>
+          </a:lnRef>
+          <a:fillRef idx="1">
+            <a:schemeClr val="lt1"/>
+          </a:fillRef>
+          <a:effectRef idx="0">
+            <a:schemeClr val="dk1"/>
+          </a:effectRef>
+          <a:fontRef idx="minor">
+            <a:schemeClr val="dk1"/>
+          </a:fontRef>
+        </p:style>
+        <p:txBody>
+          <a:bodyPr wrap="square">
+            <a:spAutoFit/>
+          </a:bodyPr>
+          <a:lstStyle/>
+          <a:p>
+            <a:r>
+              <a:rPr lang="en-US" dirty="0"/>
+              <a:t>https://expressjs.com/en/starter/hello-world.html</a:t>
+            </a:r>
+          </a:p>
+        </p:txBody>
+      </p:sp>
+    </p:spTree>
+    <p:extLst>
+      <p:ext uri="{BB962C8B-B14F-4D97-AF65-F5344CB8AC3E}">
+        <p14:creationId xmlns:p14="http://schemas.microsoft.com/office/powerpoint/2010/main" val="3513977778"/>
+      </p:ext>
+    </p:extLst>
+  </p:cSld>
+  <p:clrMapOvr>
+    <a:masterClrMapping/>
+  </p:clrMapOvr>
+</p:sld>
+</file>
+
+<file path=ppt/slides/slide16.xml><?xml version="1.0" encoding="utf-8"?>
+<p:sld xmlns:a="http://schemas.openxmlformats.org/drawingml/2006/main" xmlns:r="http://schemas.openxmlformats.org/officeDocument/2006/relationships" xmlns:p="http://schemas.openxmlformats.org/presentationml/2006/main">
+  <p:cSld>
+    <p:spTree>
+      <p:nvGrpSpPr>
+        <p:cNvPr id="1" name=""/>
+        <p:cNvGrpSpPr/>
+        <p:nvPr/>
+      </p:nvGrpSpPr>
+      <p:grpSpPr>
+        <a:xfrm>
+          <a:off x="0" y="0"/>
+          <a:ext cx="0" cy="0"/>
+          <a:chOff x="0" y="0"/>
+          <a:chExt cx="0" cy="0"/>
+        </a:xfrm>
+      </p:grpSpPr>
+      <p:sp>
+        <p:nvSpPr>
+          <p:cNvPr id="2" name="Title 1">
+            <a:extLst>
+              <a:ext uri="{FF2B5EF4-FFF2-40B4-BE49-F238E27FC236}">
                 <a16:creationId xmlns:a16="http://schemas.microsoft.com/office/drawing/2014/main" id="{F77B9B9D-546F-4244-84F2-75412D3541A1}"/>
               </a:ext>
             </a:extLst>
@@ -6985,7 +7551,7 @@
           <a:p>
             <a:fld id="{20F37917-FD3A-4669-9018-DA04BCDD3D75}" type="slidenum">
               <a:rPr lang="en-US" smtClean="0"/>
-              <a:t>14</a:t>
+              <a:t>16</a:t>
             </a:fld>
             <a:endParaRPr lang="en-US"/>
           </a:p>
@@ -7040,7 +7606,7 @@
 </p:sld>
 </file>
 
-<file path=ppt/slides/slide15.xml><?xml version="1.0" encoding="utf-8"?>
+<file path=ppt/slides/slide17.xml><?xml version="1.0" encoding="utf-8"?>
 <p:sld xmlns:a="http://schemas.openxmlformats.org/drawingml/2006/main" xmlns:r="http://schemas.openxmlformats.org/officeDocument/2006/relationships" xmlns:p="http://schemas.openxmlformats.org/presentationml/2006/main">
   <p:cSld>
     <p:spTree>
@@ -7062,7 +7628,7 @@
           <p:cNvPr id="2" name="Title 1">
             <a:extLst>
               <a:ext uri="{FF2B5EF4-FFF2-40B4-BE49-F238E27FC236}">
-                <a16:creationId xmlns:a16="http://schemas.microsoft.com/office/drawing/2014/main" id="{E743D407-5B53-49A7-9907-E801EA7FFD8E}"/>
+                <a16:creationId xmlns:a16="http://schemas.microsoft.com/office/drawing/2014/main" id="{09D62C7B-D717-4B85-A548-BEF337106022}"/>
               </a:ext>
             </a:extLst>
           </p:cNvPr>
@@ -7080,7 +7646,7 @@
           <a:p>
             <a:r>
               <a:rPr lang="en-US" dirty="0"/>
-              <a:t>Learning Goals for this Lesson</a:t>
+              <a:t>Each piece can have its own architecture</a:t>
             </a:r>
           </a:p>
         </p:txBody>
@@ -7090,7 +7656,7 @@
           <p:cNvPr id="3" name="Content Placeholder 2">
             <a:extLst>
               <a:ext uri="{FF2B5EF4-FFF2-40B4-BE49-F238E27FC236}">
-                <a16:creationId xmlns:a16="http://schemas.microsoft.com/office/drawing/2014/main" id="{AC300E2B-BFD0-4090-AFC5-FE82683F997F}"/>
+                <a16:creationId xmlns:a16="http://schemas.microsoft.com/office/drawing/2014/main" id="{9AAFE06E-931D-468C-9FDB-AA8CF4B0E596}"/>
               </a:ext>
             </a:extLst>
           </p:cNvPr>
@@ -7108,21 +7674,25 @@
           <a:p>
             <a:r>
               <a:rPr lang="en-US" dirty="0"/>
-              <a:t>At this point, you should be able to</a:t>
-            </a:r>
-          </a:p>
-          <a:p>
-            <a:pPr lvl="1"/>
-            <a:r>
-              <a:rPr lang="en-US" dirty="0"/>
-              <a:t>Give 4 examples of software architectural styles and their distinguishing characteristics</a:t>
-            </a:r>
-          </a:p>
-          <a:p>
-            <a:pPr lvl="1"/>
-            <a:r>
-              <a:rPr lang="en-US" dirty="0"/>
-              <a:t>Draw a picture or give an example to illustrate each one</a:t>
+              <a:t>We can use the same ideas to talk about each piece of the overall architecture.</a:t>
+            </a:r>
+          </a:p>
+          <a:p>
+            <a:r>
+              <a:rPr lang="en-US" dirty="0"/>
+              <a:t>For example, the backend of </a:t>
+            </a:r>
+            <a:r>
+              <a:rPr lang="en-US" dirty="0" err="1"/>
+              <a:t>covey.town</a:t>
+            </a:r>
+            <a:r>
+              <a:rPr lang="en-US" dirty="0"/>
+              <a:t> (the subject of our team project) is a layered architecture.   The higher levels (those closest to the user) are event-driven, but the lower layers are </a:t>
+            </a:r>
+            <a:r>
+              <a:rPr lang="en-US"/>
+              <a:t>more object-oriented.</a:t>
             </a:r>
           </a:p>
         </p:txBody>
@@ -7132,7 +7702,7 @@
           <p:cNvPr id="4" name="Slide Number Placeholder 3">
             <a:extLst>
               <a:ext uri="{FF2B5EF4-FFF2-40B4-BE49-F238E27FC236}">
-                <a16:creationId xmlns:a16="http://schemas.microsoft.com/office/drawing/2014/main" id="{B7BF3F82-6F96-41E0-9C15-23CE00076176}"/>
+                <a16:creationId xmlns:a16="http://schemas.microsoft.com/office/drawing/2014/main" id="{C4BF8D61-AFE8-43F5-B0B9-3293DCE9E0A1}"/>
               </a:ext>
             </a:extLst>
           </p:cNvPr>
@@ -7150,7 +7720,136 @@
           <a:p>
             <a:fld id="{20F37917-FD3A-4669-9018-DA04BCDD3D75}" type="slidenum">
               <a:rPr lang="en-US" smtClean="0"/>
-              <a:t>15</a:t>
+              <a:t>17</a:t>
+            </a:fld>
+            <a:endParaRPr lang="en-US"/>
+          </a:p>
+        </p:txBody>
+      </p:sp>
+    </p:spTree>
+    <p:extLst>
+      <p:ext uri="{BB962C8B-B14F-4D97-AF65-F5344CB8AC3E}">
+        <p14:creationId xmlns:p14="http://schemas.microsoft.com/office/powerpoint/2010/main" val="3517568678"/>
+      </p:ext>
+    </p:extLst>
+  </p:cSld>
+  <p:clrMapOvr>
+    <a:masterClrMapping/>
+  </p:clrMapOvr>
+</p:sld>
+</file>
+
+<file path=ppt/slides/slide18.xml><?xml version="1.0" encoding="utf-8"?>
+<p:sld xmlns:a="http://schemas.openxmlformats.org/drawingml/2006/main" xmlns:r="http://schemas.openxmlformats.org/officeDocument/2006/relationships" xmlns:p="http://schemas.openxmlformats.org/presentationml/2006/main">
+  <p:cSld>
+    <p:spTree>
+      <p:nvGrpSpPr>
+        <p:cNvPr id="1" name=""/>
+        <p:cNvGrpSpPr/>
+        <p:nvPr/>
+      </p:nvGrpSpPr>
+      <p:grpSpPr>
+        <a:xfrm>
+          <a:off x="0" y="0"/>
+          <a:ext cx="0" cy="0"/>
+          <a:chOff x="0" y="0"/>
+          <a:chExt cx="0" cy="0"/>
+        </a:xfrm>
+      </p:grpSpPr>
+      <p:sp>
+        <p:nvSpPr>
+          <p:cNvPr id="2" name="Title 1">
+            <a:extLst>
+              <a:ext uri="{FF2B5EF4-FFF2-40B4-BE49-F238E27FC236}">
+                <a16:creationId xmlns:a16="http://schemas.microsoft.com/office/drawing/2014/main" id="{E743D407-5B53-49A7-9907-E801EA7FFD8E}"/>
+              </a:ext>
+            </a:extLst>
+          </p:cNvPr>
+          <p:cNvSpPr>
+            <a:spLocks noGrp="1"/>
+          </p:cNvSpPr>
+          <p:nvPr>
+            <p:ph type="title"/>
+          </p:nvPr>
+        </p:nvSpPr>
+        <p:spPr/>
+        <p:txBody>
+          <a:bodyPr/>
+          <a:lstStyle/>
+          <a:p>
+            <a:r>
+              <a:rPr lang="en-US" dirty="0"/>
+              <a:t>Learning Goals for this Lesson</a:t>
+            </a:r>
+          </a:p>
+        </p:txBody>
+      </p:sp>
+      <p:sp>
+        <p:nvSpPr>
+          <p:cNvPr id="3" name="Content Placeholder 2">
+            <a:extLst>
+              <a:ext uri="{FF2B5EF4-FFF2-40B4-BE49-F238E27FC236}">
+                <a16:creationId xmlns:a16="http://schemas.microsoft.com/office/drawing/2014/main" id="{AC300E2B-BFD0-4090-AFC5-FE82683F997F}"/>
+              </a:ext>
+            </a:extLst>
+          </p:cNvPr>
+          <p:cNvSpPr>
+            <a:spLocks noGrp="1"/>
+          </p:cNvSpPr>
+          <p:nvPr>
+            <p:ph idx="1"/>
+          </p:nvPr>
+        </p:nvSpPr>
+        <p:spPr/>
+        <p:txBody>
+          <a:bodyPr/>
+          <a:lstStyle/>
+          <a:p>
+            <a:r>
+              <a:rPr lang="en-US" dirty="0"/>
+              <a:t>At this point, you should be able to</a:t>
+            </a:r>
+          </a:p>
+          <a:p>
+            <a:pPr lvl="1"/>
+            <a:r>
+              <a:rPr lang="en-US" dirty="0"/>
+              <a:t>Give 5 examples of software architectural styles and their distinguishing characteristics</a:t>
+            </a:r>
+          </a:p>
+          <a:p>
+            <a:pPr lvl="1"/>
+            <a:r>
+              <a:rPr lang="en-US" dirty="0"/>
+              <a:t>Draw a picture or give an example to illustrate each one</a:t>
+            </a:r>
+          </a:p>
+        </p:txBody>
+      </p:sp>
+      <p:sp>
+        <p:nvSpPr>
+          <p:cNvPr id="4" name="Slide Number Placeholder 3">
+            <a:extLst>
+              <a:ext uri="{FF2B5EF4-FFF2-40B4-BE49-F238E27FC236}">
+                <a16:creationId xmlns:a16="http://schemas.microsoft.com/office/drawing/2014/main" id="{B7BF3F82-6F96-41E0-9C15-23CE00076176}"/>
+              </a:ext>
+            </a:extLst>
+          </p:cNvPr>
+          <p:cNvSpPr>
+            <a:spLocks noGrp="1"/>
+          </p:cNvSpPr>
+          <p:nvPr>
+            <p:ph type="sldNum" sz="quarter" idx="12"/>
+          </p:nvPr>
+        </p:nvSpPr>
+        <p:spPr/>
+        <p:txBody>
+          <a:bodyPr/>
+          <a:lstStyle/>
+          <a:p>
+            <a:fld id="{20F37917-FD3A-4669-9018-DA04BCDD3D75}" type="slidenum">
+              <a:rPr lang="en-US" smtClean="0"/>
+              <a:t>18</a:t>
             </a:fld>
             <a:endParaRPr lang="en-US"/>
           </a:p>
@@ -7244,7 +7943,7 @@
             <a:pPr lvl="1"/>
             <a:r>
               <a:rPr lang="en-US" dirty="0"/>
-              <a:t>Give 4 examples of software architectural styles and their distinguishing characteristics</a:t>
+              <a:t>Give 5 examples of software architectural styles and their distinguishing characteristics</a:t>
             </a:r>
           </a:p>
           <a:p>
@@ -7665,24 +8364,50 @@
           <a:bodyPr/>
           <a:lstStyle/>
           <a:p>
+            <a:pPr marL="514350" indent="-514350">
+              <a:buFont typeface="+mj-lt"/>
+              <a:buAutoNum type="arabicPeriod"/>
+            </a:pPr>
             <a:r>
               <a:rPr lang="en-US" dirty="0"/>
               <a:t>Object-oriented</a:t>
             </a:r>
           </a:p>
           <a:p>
+            <a:pPr marL="514350" indent="-514350">
+              <a:buFont typeface="+mj-lt"/>
+              <a:buAutoNum type="arabicPeriod"/>
+            </a:pPr>
             <a:r>
               <a:rPr lang="en-US" dirty="0"/>
               <a:t>Layered</a:t>
             </a:r>
           </a:p>
           <a:p>
+            <a:pPr marL="514350" indent="-514350">
+              <a:buFont typeface="+mj-lt"/>
+              <a:buAutoNum type="arabicPeriod"/>
+            </a:pPr>
             <a:r>
               <a:rPr lang="en-US" dirty="0"/>
               <a:t>Pipeline</a:t>
             </a:r>
           </a:p>
           <a:p>
+            <a:pPr marL="514350" indent="-514350">
+              <a:buFont typeface="+mj-lt"/>
+              <a:buAutoNum type="arabicPeriod"/>
+            </a:pPr>
+            <a:r>
+              <a:rPr lang="en-US" dirty="0"/>
+              <a:t>Microkernel</a:t>
+            </a:r>
+          </a:p>
+          <a:p>
+            <a:pPr marL="514350" indent="-514350">
+              <a:buFont typeface="+mj-lt"/>
+              <a:buAutoNum type="arabicPeriod"/>
+            </a:pPr>
             <a:r>
               <a:rPr lang="en-US" dirty="0"/>
               <a:t>Event-driven</a:t>

</xml_diff>

<commit_message>
fixed font sizes, and replaced slides to ensure consistent theme
</commit_message>
<xml_diff>
--- a/Slides/Lesson 2.2 The Architectural Scale.pptx
+++ b/Slides/Lesson 2.2 The Architectural Scale.pptx
@@ -260,7 +260,7 @@
           <a:p>
             <a:fld id="{7C7E5181-6CF5-45F7-A87A-E0E0B1FD7549}" type="datetimeFigureOut">
               <a:rPr lang="en-US" smtClean="0"/>
-              <a:t>1/22/2022</a:t>
+              <a:t>1/23/2022</a:t>
             </a:fld>
             <a:endParaRPr lang="en-US"/>
           </a:p>
@@ -2143,7 +2143,7 @@
           <a:p>
             <a:fld id="{5D2A64DE-480B-420F-9649-4F8E696E08E0}" type="datetime1">
               <a:rPr lang="en-US" smtClean="0"/>
-              <a:t>1/22/2022</a:t>
+              <a:t>1/23/2022</a:t>
             </a:fld>
             <a:endParaRPr lang="en-US"/>
           </a:p>
@@ -2467,7 +2467,7 @@
           <a:p>
             <a:fld id="{EA476A42-A091-4468-A075-64A31BE59948}" type="datetime1">
               <a:rPr lang="en-US" smtClean="0"/>
-              <a:t>1/22/2022</a:t>
+              <a:t>1/23/2022</a:t>
             </a:fld>
             <a:endParaRPr lang="en-US"/>
           </a:p>
@@ -2665,7 +2665,7 @@
           <a:p>
             <a:fld id="{0D3616D0-8311-4107-9726-6B805E7D05BA}" type="datetime1">
               <a:rPr lang="en-US" smtClean="0"/>
-              <a:t>1/22/2022</a:t>
+              <a:t>1/23/2022</a:t>
             </a:fld>
             <a:endParaRPr lang="en-US"/>
           </a:p>
@@ -2873,7 +2873,7 @@
           <a:p>
             <a:fld id="{3BC2557A-5C88-417A-A763-5AC779462A5F}" type="datetime1">
               <a:rPr lang="en-US" smtClean="0"/>
-              <a:t>1/22/2022</a:t>
+              <a:t>1/23/2022</a:t>
             </a:fld>
             <a:endParaRPr lang="en-US"/>
           </a:p>
@@ -3397,7 +3397,7 @@
           <a:p>
             <a:fld id="{07C7BFD4-467E-4EDE-93EA-052F5B39A4E5}" type="datetime1">
               <a:rPr lang="en-US" smtClean="0"/>
-              <a:t>1/22/2022</a:t>
+              <a:t>1/23/2022</a:t>
             </a:fld>
             <a:endParaRPr lang="en-US"/>
           </a:p>
@@ -3647,7 +3647,7 @@
           <a:p>
             <a:fld id="{07C7BFD4-467E-4EDE-93EA-052F5B39A4E5}" type="datetime1">
               <a:rPr lang="en-US" smtClean="0"/>
-              <a:t>1/22/2022</a:t>
+              <a:t>1/23/2022</a:t>
             </a:fld>
             <a:endParaRPr lang="en-US"/>
           </a:p>
@@ -3829,7 +3829,7 @@
           <a:p>
             <a:fld id="{109E55A0-C911-4F03-82FC-7E5926047D46}" type="datetime1">
               <a:rPr lang="en-US" smtClean="0"/>
-              <a:t>1/22/2022</a:t>
+              <a:t>1/23/2022</a:t>
             </a:fld>
             <a:endParaRPr lang="en-US"/>
           </a:p>
@@ -4142,7 +4142,7 @@
           <a:p>
             <a:fld id="{A533CBE2-D5BE-47AC-ADC2-9CDFC1D0CF90}" type="datetime1">
               <a:rPr lang="en-US" smtClean="0"/>
-              <a:t>1/22/2022</a:t>
+              <a:t>1/23/2022</a:t>
             </a:fld>
             <a:endParaRPr lang="en-US"/>
           </a:p>
@@ -4443,7 +4443,7 @@
           <a:p>
             <a:fld id="{39B7EDB1-CE74-4951-85A2-0B01C2128E28}" type="datetime1">
               <a:rPr lang="en-US" smtClean="0"/>
-              <a:t>1/22/2022</a:t>
+              <a:t>1/23/2022</a:t>
             </a:fld>
             <a:endParaRPr lang="en-US"/>
           </a:p>
@@ -4891,7 +4891,7 @@
           <a:p>
             <a:fld id="{2BC7EB92-A5C2-4807-A9DC-9EDE6CBFB241}" type="datetime1">
               <a:rPr lang="en-US" smtClean="0"/>
-              <a:t>1/22/2022</a:t>
+              <a:t>1/23/2022</a:t>
             </a:fld>
             <a:endParaRPr lang="en-US"/>
           </a:p>
@@ -5004,7 +5004,7 @@
           <a:p>
             <a:fld id="{2B7B7EE0-7771-4CD5-9B2B-3550753A54A1}" type="datetime1">
               <a:rPr lang="en-US" smtClean="0"/>
-              <a:t>1/22/2022</a:t>
+              <a:t>1/23/2022</a:t>
             </a:fld>
             <a:endParaRPr lang="en-US"/>
           </a:p>
@@ -5315,7 +5315,7 @@
           <a:p>
             <a:fld id="{F8B318B3-0E87-4416-A9B8-D891968C2727}" type="datetime1">
               <a:rPr lang="en-US" smtClean="0"/>
-              <a:t>1/22/2022</a:t>
+              <a:t>1/23/2022</a:t>
             </a:fld>
             <a:endParaRPr lang="en-US"/>
           </a:p>
@@ -5556,7 +5556,7 @@
           <a:p>
             <a:fld id="{54D997E8-DDEE-43F1-8D9B-F8A1E11DE488}" type="datetime1">
               <a:rPr lang="en-US" smtClean="0"/>
-              <a:t>1/22/2022</a:t>
+              <a:t>1/23/2022</a:t>
             </a:fld>
             <a:endParaRPr lang="en-US"/>
           </a:p>
@@ -7287,11 +7287,13 @@
         </p:nvSpPr>
         <p:spPr/>
         <p:txBody>
-          <a:bodyPr/>
-          <a:lstStyle/>
-          <a:p>
-            <a:r>
-              <a:rPr lang="en-US" dirty="0"/>
+          <a:bodyPr>
+            <a:normAutofit/>
+          </a:bodyPr>
+          <a:lstStyle/>
+          <a:p>
+            <a:r>
+              <a:rPr lang="en-US" sz="3600" dirty="0"/>
               <a:t>Express.js provides methods for modifying its built-in actions</a:t>
             </a:r>
           </a:p>

</xml_diff>